<commit_message>
Actualizaciones de varios documentos
</commit_message>
<xml_diff>
--- a/Primer taller/Arboles_Guia.pptx
+++ b/Primer taller/Arboles_Guia.pptx
@@ -7,6 +7,8 @@
   <p:sldIdLst>
     <p:sldId id="256" r:id="rId2"/>
     <p:sldId id="257" r:id="rId3"/>
+    <p:sldId id="258" r:id="rId4"/>
+    <p:sldId id="259" r:id="rId5"/>
   </p:sldIdLst>
   <p:sldSz cx="12192000" cy="6858000"/>
   <p:notesSz cx="6858000" cy="9144000"/>
@@ -244,7 +246,7 @@
           <a:p>
             <a:fld id="{E6D8155D-2A74-4A6D-924E-D33934FEF8DA}" type="datetimeFigureOut">
               <a:rPr lang="en-US" smtClean="0"/>
-              <a:t>9/20/2022</a:t>
+              <a:t>9/27/2022</a:t>
             </a:fld>
             <a:endParaRPr lang="en-US"/>
           </a:p>
@@ -414,7 +416,7 @@
           <a:p>
             <a:fld id="{E6D8155D-2A74-4A6D-924E-D33934FEF8DA}" type="datetimeFigureOut">
               <a:rPr lang="en-US" smtClean="0"/>
-              <a:t>9/20/2022</a:t>
+              <a:t>9/27/2022</a:t>
             </a:fld>
             <a:endParaRPr lang="en-US"/>
           </a:p>
@@ -594,7 +596,7 @@
           <a:p>
             <a:fld id="{E6D8155D-2A74-4A6D-924E-D33934FEF8DA}" type="datetimeFigureOut">
               <a:rPr lang="en-US" smtClean="0"/>
-              <a:t>9/20/2022</a:t>
+              <a:t>9/27/2022</a:t>
             </a:fld>
             <a:endParaRPr lang="en-US"/>
           </a:p>
@@ -764,7 +766,7 @@
           <a:p>
             <a:fld id="{E6D8155D-2A74-4A6D-924E-D33934FEF8DA}" type="datetimeFigureOut">
               <a:rPr lang="en-US" smtClean="0"/>
-              <a:t>9/20/2022</a:t>
+              <a:t>9/27/2022</a:t>
             </a:fld>
             <a:endParaRPr lang="en-US"/>
           </a:p>
@@ -1010,7 +1012,7 @@
           <a:p>
             <a:fld id="{E6D8155D-2A74-4A6D-924E-D33934FEF8DA}" type="datetimeFigureOut">
               <a:rPr lang="en-US" smtClean="0"/>
-              <a:t>9/20/2022</a:t>
+              <a:t>9/27/2022</a:t>
             </a:fld>
             <a:endParaRPr lang="en-US"/>
           </a:p>
@@ -1242,7 +1244,7 @@
           <a:p>
             <a:fld id="{E6D8155D-2A74-4A6D-924E-D33934FEF8DA}" type="datetimeFigureOut">
               <a:rPr lang="en-US" smtClean="0"/>
-              <a:t>9/20/2022</a:t>
+              <a:t>9/27/2022</a:t>
             </a:fld>
             <a:endParaRPr lang="en-US"/>
           </a:p>
@@ -1609,7 +1611,7 @@
           <a:p>
             <a:fld id="{E6D8155D-2A74-4A6D-924E-D33934FEF8DA}" type="datetimeFigureOut">
               <a:rPr lang="en-US" smtClean="0"/>
-              <a:t>9/20/2022</a:t>
+              <a:t>9/27/2022</a:t>
             </a:fld>
             <a:endParaRPr lang="en-US"/>
           </a:p>
@@ -1727,7 +1729,7 @@
           <a:p>
             <a:fld id="{E6D8155D-2A74-4A6D-924E-D33934FEF8DA}" type="datetimeFigureOut">
               <a:rPr lang="en-US" smtClean="0"/>
-              <a:t>9/20/2022</a:t>
+              <a:t>9/27/2022</a:t>
             </a:fld>
             <a:endParaRPr lang="en-US"/>
           </a:p>
@@ -1822,7 +1824,7 @@
           <a:p>
             <a:fld id="{E6D8155D-2A74-4A6D-924E-D33934FEF8DA}" type="datetimeFigureOut">
               <a:rPr lang="en-US" smtClean="0"/>
-              <a:t>9/20/2022</a:t>
+              <a:t>9/27/2022</a:t>
             </a:fld>
             <a:endParaRPr lang="en-US"/>
           </a:p>
@@ -2099,7 +2101,7 @@
           <a:p>
             <a:fld id="{E6D8155D-2A74-4A6D-924E-D33934FEF8DA}" type="datetimeFigureOut">
               <a:rPr lang="en-US" smtClean="0"/>
-              <a:t>9/20/2022</a:t>
+              <a:t>9/27/2022</a:t>
             </a:fld>
             <a:endParaRPr lang="en-US"/>
           </a:p>
@@ -2352,7 +2354,7 @@
           <a:p>
             <a:fld id="{E6D8155D-2A74-4A6D-924E-D33934FEF8DA}" type="datetimeFigureOut">
               <a:rPr lang="en-US" smtClean="0"/>
-              <a:t>9/20/2022</a:t>
+              <a:t>9/27/2022</a:t>
             </a:fld>
             <a:endParaRPr lang="en-US"/>
           </a:p>
@@ -2565,7 +2567,7 @@
           <a:p>
             <a:fld id="{E6D8155D-2A74-4A6D-924E-D33934FEF8DA}" type="datetimeFigureOut">
               <a:rPr lang="en-US" smtClean="0"/>
-              <a:t>9/20/2022</a:t>
+              <a:t>9/27/2022</a:t>
             </a:fld>
             <a:endParaRPr lang="en-US"/>
           </a:p>
@@ -8344,6 +8346,3968 @@
 </p:sld>
 </file>
 
+<file path=ppt/slides/slide3.xml><?xml version="1.0" encoding="utf-8"?>
+<p:sld xmlns:a="http://schemas.openxmlformats.org/drawingml/2006/main" xmlns:r="http://schemas.openxmlformats.org/officeDocument/2006/relationships" xmlns:p="http://schemas.openxmlformats.org/presentationml/2006/main">
+  <p:cSld>
+    <p:spTree>
+      <p:nvGrpSpPr>
+        <p:cNvPr id="1" name=""/>
+        <p:cNvGrpSpPr/>
+        <p:nvPr/>
+      </p:nvGrpSpPr>
+      <p:grpSpPr>
+        <a:xfrm>
+          <a:off x="0" y="0"/>
+          <a:ext cx="0" cy="0"/>
+          <a:chOff x="0" y="0"/>
+          <a:chExt cx="0" cy="0"/>
+        </a:xfrm>
+      </p:grpSpPr>
+      <p:sp>
+        <p:nvSpPr>
+          <p:cNvPr id="4" name="Elipse 3"/>
+          <p:cNvSpPr/>
+          <p:nvPr/>
+        </p:nvSpPr>
+        <p:spPr>
+          <a:xfrm>
+            <a:off x="5769033" y="382386"/>
+            <a:ext cx="631767" cy="515389"/>
+          </a:xfrm>
+          <a:prstGeom prst="ellipse">
+            <a:avLst/>
+          </a:prstGeom>
+          <a:solidFill>
+            <a:srgbClr val="D5E8D4"/>
+          </a:solidFill>
+          <a:ln>
+            <a:solidFill>
+              <a:srgbClr val="96BF80"/>
+            </a:solidFill>
+          </a:ln>
+        </p:spPr>
+        <p:style>
+          <a:lnRef idx="2">
+            <a:schemeClr val="accent1">
+              <a:shade val="50000"/>
+            </a:schemeClr>
+          </a:lnRef>
+          <a:fillRef idx="1">
+            <a:schemeClr val="accent1"/>
+          </a:fillRef>
+          <a:effectRef idx="0">
+            <a:schemeClr val="accent1"/>
+          </a:effectRef>
+          <a:fontRef idx="minor">
+            <a:schemeClr val="lt1"/>
+          </a:fontRef>
+        </p:style>
+        <p:txBody>
+          <a:bodyPr rtlCol="0" anchor="ctr"/>
+          <a:lstStyle/>
+          <a:p>
+            <a:pPr algn="ctr"/>
+            <a:r>
+              <a:rPr lang="es-ES" dirty="0">
+                <a:solidFill>
+                  <a:schemeClr val="tx1"/>
+                </a:solidFill>
+                <a:latin typeface="Arial" panose="020B0604020202020204" pitchFamily="34" charset="0"/>
+                <a:cs typeface="Arial" panose="020B0604020202020204" pitchFamily="34" charset="0"/>
+              </a:rPr>
+              <a:t>D</a:t>
+            </a:r>
+            <a:endParaRPr lang="en-US" dirty="0">
+              <a:solidFill>
+                <a:schemeClr val="tx1"/>
+              </a:solidFill>
+              <a:latin typeface="Arial" panose="020B0604020202020204" pitchFamily="34" charset="0"/>
+              <a:cs typeface="Arial" panose="020B0604020202020204" pitchFamily="34" charset="0"/>
+            </a:endParaRPr>
+          </a:p>
+        </p:txBody>
+      </p:sp>
+      <p:sp>
+        <p:nvSpPr>
+          <p:cNvPr id="6" name="Elipse 5"/>
+          <p:cNvSpPr/>
+          <p:nvPr/>
+        </p:nvSpPr>
+        <p:spPr>
+          <a:xfrm>
+            <a:off x="4168614" y="1600130"/>
+            <a:ext cx="631767" cy="515389"/>
+          </a:xfrm>
+          <a:prstGeom prst="ellipse">
+            <a:avLst/>
+          </a:prstGeom>
+          <a:solidFill>
+            <a:srgbClr val="D5E8D4"/>
+          </a:solidFill>
+          <a:ln>
+            <a:solidFill>
+              <a:srgbClr val="96BF80"/>
+            </a:solidFill>
+          </a:ln>
+        </p:spPr>
+        <p:style>
+          <a:lnRef idx="2">
+            <a:schemeClr val="accent1">
+              <a:shade val="50000"/>
+            </a:schemeClr>
+          </a:lnRef>
+          <a:fillRef idx="1">
+            <a:schemeClr val="accent1"/>
+          </a:fillRef>
+          <a:effectRef idx="0">
+            <a:schemeClr val="accent1"/>
+          </a:effectRef>
+          <a:fontRef idx="minor">
+            <a:schemeClr val="lt1"/>
+          </a:fontRef>
+        </p:style>
+        <p:txBody>
+          <a:bodyPr rtlCol="0" anchor="ctr"/>
+          <a:lstStyle/>
+          <a:p>
+            <a:pPr algn="ctr"/>
+            <a:r>
+              <a:rPr lang="es-ES" dirty="0">
+                <a:solidFill>
+                  <a:schemeClr val="tx1"/>
+                </a:solidFill>
+                <a:latin typeface="Arial" panose="020B0604020202020204" pitchFamily="34" charset="0"/>
+                <a:cs typeface="Arial" panose="020B0604020202020204" pitchFamily="34" charset="0"/>
+              </a:rPr>
+              <a:t>I</a:t>
+            </a:r>
+            <a:endParaRPr lang="en-US" dirty="0">
+              <a:solidFill>
+                <a:schemeClr val="tx1"/>
+              </a:solidFill>
+              <a:latin typeface="Arial" panose="020B0604020202020204" pitchFamily="34" charset="0"/>
+              <a:cs typeface="Arial" panose="020B0604020202020204" pitchFamily="34" charset="0"/>
+            </a:endParaRPr>
+          </a:p>
+        </p:txBody>
+      </p:sp>
+      <p:cxnSp>
+        <p:nvCxnSpPr>
+          <p:cNvPr id="8" name="Conector recto 7"/>
+          <p:cNvCxnSpPr>
+            <a:stCxn id="4" idx="4"/>
+            <a:endCxn id="11" idx="0"/>
+          </p:cNvCxnSpPr>
+          <p:nvPr/>
+        </p:nvCxnSpPr>
+        <p:spPr>
+          <a:xfrm>
+            <a:off x="6084917" y="897775"/>
+            <a:ext cx="751591" cy="824748"/>
+          </a:xfrm>
+          <a:prstGeom prst="line">
+            <a:avLst/>
+          </a:prstGeom>
+          <a:ln>
+            <a:solidFill>
+              <a:schemeClr val="tx1"/>
+            </a:solidFill>
+          </a:ln>
+        </p:spPr>
+        <p:style>
+          <a:lnRef idx="1">
+            <a:schemeClr val="accent1"/>
+          </a:lnRef>
+          <a:fillRef idx="0">
+            <a:schemeClr val="accent1"/>
+          </a:fillRef>
+          <a:effectRef idx="0">
+            <a:schemeClr val="accent1"/>
+          </a:effectRef>
+          <a:fontRef idx="minor">
+            <a:schemeClr val="tx1"/>
+          </a:fontRef>
+        </p:style>
+      </p:cxnSp>
+      <p:sp>
+        <p:nvSpPr>
+          <p:cNvPr id="10" name="CuadroTexto 9"/>
+          <p:cNvSpPr txBox="1"/>
+          <p:nvPr/>
+        </p:nvSpPr>
+        <p:spPr>
+          <a:xfrm>
+            <a:off x="5465931" y="4547249"/>
+            <a:ext cx="312906" cy="369332"/>
+          </a:xfrm>
+          <a:prstGeom prst="rect">
+            <a:avLst/>
+          </a:prstGeom>
+          <a:noFill/>
+        </p:spPr>
+        <p:txBody>
+          <a:bodyPr wrap="none" rtlCol="0">
+            <a:spAutoFit/>
+          </a:bodyPr>
+          <a:lstStyle/>
+          <a:p>
+            <a:r>
+              <a:rPr lang="es-ES" dirty="0" smtClean="0">
+                <a:latin typeface="Arial" panose="020B0604020202020204" pitchFamily="34" charset="0"/>
+                <a:cs typeface="Arial" panose="020B0604020202020204" pitchFamily="34" charset="0"/>
+              </a:rPr>
+              <a:t>1</a:t>
+            </a:r>
+            <a:endParaRPr lang="en-US" dirty="0">
+              <a:latin typeface="Arial" panose="020B0604020202020204" pitchFamily="34" charset="0"/>
+              <a:cs typeface="Arial" panose="020B0604020202020204" pitchFamily="34" charset="0"/>
+            </a:endParaRPr>
+          </a:p>
+        </p:txBody>
+      </p:sp>
+      <p:sp>
+        <p:nvSpPr>
+          <p:cNvPr id="11" name="Elipse 10"/>
+          <p:cNvSpPr/>
+          <p:nvPr/>
+        </p:nvSpPr>
+        <p:spPr>
+          <a:xfrm>
+            <a:off x="6520624" y="1722523"/>
+            <a:ext cx="631767" cy="515389"/>
+          </a:xfrm>
+          <a:prstGeom prst="ellipse">
+            <a:avLst/>
+          </a:prstGeom>
+          <a:solidFill>
+            <a:srgbClr val="D5E8D4"/>
+          </a:solidFill>
+          <a:ln>
+            <a:solidFill>
+              <a:srgbClr val="96BF80"/>
+            </a:solidFill>
+          </a:ln>
+        </p:spPr>
+        <p:style>
+          <a:lnRef idx="2">
+            <a:schemeClr val="accent1">
+              <a:shade val="50000"/>
+            </a:schemeClr>
+          </a:lnRef>
+          <a:fillRef idx="1">
+            <a:schemeClr val="accent1"/>
+          </a:fillRef>
+          <a:effectRef idx="0">
+            <a:schemeClr val="accent1"/>
+          </a:effectRef>
+          <a:fontRef idx="minor">
+            <a:schemeClr val="lt1"/>
+          </a:fontRef>
+        </p:style>
+        <p:txBody>
+          <a:bodyPr rtlCol="0" anchor="ctr"/>
+          <a:lstStyle/>
+          <a:p>
+            <a:pPr algn="ctr"/>
+            <a:r>
+              <a:rPr lang="es-ES" dirty="0" smtClean="0">
+                <a:solidFill>
+                  <a:schemeClr val="tx1"/>
+                </a:solidFill>
+                <a:latin typeface="Arial" panose="020B0604020202020204" pitchFamily="34" charset="0"/>
+                <a:cs typeface="Arial" panose="020B0604020202020204" pitchFamily="34" charset="0"/>
+              </a:rPr>
+              <a:t>S</a:t>
+            </a:r>
+            <a:endParaRPr lang="en-US" dirty="0">
+              <a:solidFill>
+                <a:schemeClr val="tx1"/>
+              </a:solidFill>
+              <a:latin typeface="Arial" panose="020B0604020202020204" pitchFamily="34" charset="0"/>
+              <a:cs typeface="Arial" panose="020B0604020202020204" pitchFamily="34" charset="0"/>
+            </a:endParaRPr>
+          </a:p>
+        </p:txBody>
+      </p:sp>
+      <p:cxnSp>
+        <p:nvCxnSpPr>
+          <p:cNvPr id="12" name="Conector recto 11"/>
+          <p:cNvCxnSpPr>
+            <a:stCxn id="4" idx="4"/>
+            <a:endCxn id="6" idx="0"/>
+          </p:cNvCxnSpPr>
+          <p:nvPr/>
+        </p:nvCxnSpPr>
+        <p:spPr>
+          <a:xfrm flipH="1">
+            <a:off x="4484498" y="897775"/>
+            <a:ext cx="1600419" cy="702355"/>
+          </a:xfrm>
+          <a:prstGeom prst="line">
+            <a:avLst/>
+          </a:prstGeom>
+          <a:ln>
+            <a:solidFill>
+              <a:schemeClr val="tx1"/>
+            </a:solidFill>
+          </a:ln>
+        </p:spPr>
+        <p:style>
+          <a:lnRef idx="1">
+            <a:schemeClr val="accent1"/>
+          </a:lnRef>
+          <a:fillRef idx="0">
+            <a:schemeClr val="accent1"/>
+          </a:fillRef>
+          <a:effectRef idx="0">
+            <a:schemeClr val="accent1"/>
+          </a:effectRef>
+          <a:fontRef idx="minor">
+            <a:schemeClr val="tx1"/>
+          </a:fontRef>
+        </p:style>
+      </p:cxnSp>
+      <p:sp>
+        <p:nvSpPr>
+          <p:cNvPr id="13" name="CuadroTexto 12"/>
+          <p:cNvSpPr txBox="1"/>
+          <p:nvPr/>
+        </p:nvSpPr>
+        <p:spPr>
+          <a:xfrm>
+            <a:off x="6520624" y="1062770"/>
+            <a:ext cx="312906" cy="369332"/>
+          </a:xfrm>
+          <a:prstGeom prst="rect">
+            <a:avLst/>
+          </a:prstGeom>
+          <a:noFill/>
+        </p:spPr>
+        <p:txBody>
+          <a:bodyPr wrap="none" rtlCol="0">
+            <a:spAutoFit/>
+          </a:bodyPr>
+          <a:lstStyle/>
+          <a:p>
+            <a:r>
+              <a:rPr lang="es-ES" dirty="0" smtClean="0">
+                <a:latin typeface="Arial" panose="020B0604020202020204" pitchFamily="34" charset="0"/>
+                <a:cs typeface="Arial" panose="020B0604020202020204" pitchFamily="34" charset="0"/>
+              </a:rPr>
+              <a:t>1</a:t>
+            </a:r>
+            <a:endParaRPr lang="en-US" dirty="0">
+              <a:latin typeface="Arial" panose="020B0604020202020204" pitchFamily="34" charset="0"/>
+              <a:cs typeface="Arial" panose="020B0604020202020204" pitchFamily="34" charset="0"/>
+            </a:endParaRPr>
+          </a:p>
+        </p:txBody>
+      </p:sp>
+      <p:sp>
+        <p:nvSpPr>
+          <p:cNvPr id="14" name="Rectángulo 13"/>
+          <p:cNvSpPr/>
+          <p:nvPr/>
+        </p:nvSpPr>
+        <p:spPr>
+          <a:xfrm>
+            <a:off x="6108432" y="2878134"/>
+            <a:ext cx="412192" cy="442361"/>
+          </a:xfrm>
+          <a:prstGeom prst="rect">
+            <a:avLst/>
+          </a:prstGeom>
+          <a:solidFill>
+            <a:srgbClr val="D5E8D4"/>
+          </a:solidFill>
+          <a:ln>
+            <a:solidFill>
+              <a:srgbClr val="96BF80"/>
+            </a:solidFill>
+          </a:ln>
+        </p:spPr>
+        <p:style>
+          <a:lnRef idx="2">
+            <a:schemeClr val="accent1">
+              <a:shade val="50000"/>
+            </a:schemeClr>
+          </a:lnRef>
+          <a:fillRef idx="1">
+            <a:schemeClr val="accent1"/>
+          </a:fillRef>
+          <a:effectRef idx="0">
+            <a:schemeClr val="accent1"/>
+          </a:effectRef>
+          <a:fontRef idx="minor">
+            <a:schemeClr val="lt1"/>
+          </a:fontRef>
+        </p:style>
+        <p:txBody>
+          <a:bodyPr rtlCol="0" anchor="ctr"/>
+          <a:lstStyle/>
+          <a:p>
+            <a:pPr algn="ctr"/>
+            <a:r>
+              <a:rPr lang="es-ES" dirty="0">
+                <a:solidFill>
+                  <a:schemeClr val="tx1"/>
+                </a:solidFill>
+                <a:latin typeface="Arial" panose="020B0604020202020204" pitchFamily="34" charset="0"/>
+                <a:cs typeface="Arial" panose="020B0604020202020204" pitchFamily="34" charset="0"/>
+              </a:rPr>
+              <a:t>R</a:t>
+            </a:r>
+            <a:endParaRPr lang="en-US" dirty="0">
+              <a:solidFill>
+                <a:schemeClr val="tx1"/>
+              </a:solidFill>
+              <a:latin typeface="Arial" panose="020B0604020202020204" pitchFamily="34" charset="0"/>
+              <a:cs typeface="Arial" panose="020B0604020202020204" pitchFamily="34" charset="0"/>
+            </a:endParaRPr>
+          </a:p>
+        </p:txBody>
+      </p:sp>
+      <p:sp>
+        <p:nvSpPr>
+          <p:cNvPr id="23" name="CuadroTexto 22"/>
+          <p:cNvSpPr txBox="1"/>
+          <p:nvPr/>
+        </p:nvSpPr>
+        <p:spPr>
+          <a:xfrm>
+            <a:off x="5117830" y="920684"/>
+            <a:ext cx="312906" cy="369332"/>
+          </a:xfrm>
+          <a:prstGeom prst="rect">
+            <a:avLst/>
+          </a:prstGeom>
+          <a:noFill/>
+        </p:spPr>
+        <p:txBody>
+          <a:bodyPr wrap="none" rtlCol="0">
+            <a:spAutoFit/>
+          </a:bodyPr>
+          <a:lstStyle/>
+          <a:p>
+            <a:r>
+              <a:rPr lang="es-ES" dirty="0">
+                <a:latin typeface="Arial" panose="020B0604020202020204" pitchFamily="34" charset="0"/>
+                <a:cs typeface="Arial" panose="020B0604020202020204" pitchFamily="34" charset="0"/>
+              </a:rPr>
+              <a:t>0</a:t>
+            </a:r>
+            <a:endParaRPr lang="en-US" dirty="0">
+              <a:latin typeface="Arial" panose="020B0604020202020204" pitchFamily="34" charset="0"/>
+              <a:cs typeface="Arial" panose="020B0604020202020204" pitchFamily="34" charset="0"/>
+            </a:endParaRPr>
+          </a:p>
+        </p:txBody>
+      </p:sp>
+      <p:cxnSp>
+        <p:nvCxnSpPr>
+          <p:cNvPr id="28" name="Conector recto 27"/>
+          <p:cNvCxnSpPr>
+            <a:stCxn id="32" idx="0"/>
+            <a:endCxn id="6" idx="4"/>
+          </p:cNvCxnSpPr>
+          <p:nvPr/>
+        </p:nvCxnSpPr>
+        <p:spPr>
+          <a:xfrm flipH="1" flipV="1">
+            <a:off x="4484498" y="2115519"/>
+            <a:ext cx="442784" cy="781335"/>
+          </a:xfrm>
+          <a:prstGeom prst="line">
+            <a:avLst/>
+          </a:prstGeom>
+          <a:ln>
+            <a:solidFill>
+              <a:schemeClr val="tx1"/>
+            </a:solidFill>
+          </a:ln>
+        </p:spPr>
+        <p:style>
+          <a:lnRef idx="1">
+            <a:schemeClr val="accent1"/>
+          </a:lnRef>
+          <a:fillRef idx="0">
+            <a:schemeClr val="accent1"/>
+          </a:fillRef>
+          <a:effectRef idx="0">
+            <a:schemeClr val="accent1"/>
+          </a:effectRef>
+          <a:fontRef idx="minor">
+            <a:schemeClr val="tx1"/>
+          </a:fontRef>
+        </p:style>
+      </p:cxnSp>
+      <p:sp>
+        <p:nvSpPr>
+          <p:cNvPr id="31" name="CuadroTexto 30"/>
+          <p:cNvSpPr txBox="1"/>
+          <p:nvPr/>
+        </p:nvSpPr>
+        <p:spPr>
+          <a:xfrm>
+            <a:off x="4648238" y="2314029"/>
+            <a:ext cx="312906" cy="369332"/>
+          </a:xfrm>
+          <a:prstGeom prst="rect">
+            <a:avLst/>
+          </a:prstGeom>
+          <a:noFill/>
+        </p:spPr>
+        <p:txBody>
+          <a:bodyPr wrap="none" rtlCol="0">
+            <a:spAutoFit/>
+          </a:bodyPr>
+          <a:lstStyle/>
+          <a:p>
+            <a:r>
+              <a:rPr lang="es-ES" dirty="0" smtClean="0">
+                <a:latin typeface="Arial" panose="020B0604020202020204" pitchFamily="34" charset="0"/>
+                <a:cs typeface="Arial" panose="020B0604020202020204" pitchFamily="34" charset="0"/>
+              </a:rPr>
+              <a:t>1</a:t>
+            </a:r>
+            <a:endParaRPr lang="en-US" dirty="0">
+              <a:latin typeface="Arial" panose="020B0604020202020204" pitchFamily="34" charset="0"/>
+              <a:cs typeface="Arial" panose="020B0604020202020204" pitchFamily="34" charset="0"/>
+            </a:endParaRPr>
+          </a:p>
+        </p:txBody>
+      </p:sp>
+      <p:sp>
+        <p:nvSpPr>
+          <p:cNvPr id="32" name="Elipse 31"/>
+          <p:cNvSpPr/>
+          <p:nvPr/>
+        </p:nvSpPr>
+        <p:spPr>
+          <a:xfrm>
+            <a:off x="4611398" y="2896854"/>
+            <a:ext cx="631767" cy="515389"/>
+          </a:xfrm>
+          <a:prstGeom prst="ellipse">
+            <a:avLst/>
+          </a:prstGeom>
+          <a:solidFill>
+            <a:srgbClr val="D5E8D4"/>
+          </a:solidFill>
+          <a:ln>
+            <a:solidFill>
+              <a:srgbClr val="96BF80"/>
+            </a:solidFill>
+          </a:ln>
+        </p:spPr>
+        <p:style>
+          <a:lnRef idx="2">
+            <a:schemeClr val="accent1">
+              <a:shade val="50000"/>
+            </a:schemeClr>
+          </a:lnRef>
+          <a:fillRef idx="1">
+            <a:schemeClr val="accent1"/>
+          </a:fillRef>
+          <a:effectRef idx="0">
+            <a:schemeClr val="accent1"/>
+          </a:effectRef>
+          <a:fontRef idx="minor">
+            <a:schemeClr val="lt1"/>
+          </a:fontRef>
+        </p:style>
+        <p:txBody>
+          <a:bodyPr rtlCol="0" anchor="ctr"/>
+          <a:lstStyle/>
+          <a:p>
+            <a:pPr algn="ctr"/>
+            <a:r>
+              <a:rPr lang="es-ES" dirty="0">
+                <a:solidFill>
+                  <a:schemeClr val="tx1"/>
+                </a:solidFill>
+                <a:latin typeface="Arial" panose="020B0604020202020204" pitchFamily="34" charset="0"/>
+                <a:cs typeface="Arial" panose="020B0604020202020204" pitchFamily="34" charset="0"/>
+              </a:rPr>
+              <a:t>H</a:t>
+            </a:r>
+            <a:endParaRPr lang="en-US" dirty="0">
+              <a:solidFill>
+                <a:schemeClr val="tx1"/>
+              </a:solidFill>
+              <a:latin typeface="Arial" panose="020B0604020202020204" pitchFamily="34" charset="0"/>
+              <a:cs typeface="Arial" panose="020B0604020202020204" pitchFamily="34" charset="0"/>
+            </a:endParaRPr>
+          </a:p>
+        </p:txBody>
+      </p:sp>
+      <p:cxnSp>
+        <p:nvCxnSpPr>
+          <p:cNvPr id="37" name="Conector recto 36"/>
+          <p:cNvCxnSpPr>
+            <a:stCxn id="43" idx="0"/>
+            <a:endCxn id="32" idx="4"/>
+          </p:cNvCxnSpPr>
+          <p:nvPr/>
+        </p:nvCxnSpPr>
+        <p:spPr>
+          <a:xfrm flipH="1" flipV="1">
+            <a:off x="4927282" y="3412243"/>
+            <a:ext cx="329575" cy="583103"/>
+          </a:xfrm>
+          <a:prstGeom prst="line">
+            <a:avLst/>
+          </a:prstGeom>
+          <a:ln>
+            <a:solidFill>
+              <a:schemeClr val="tx1"/>
+            </a:solidFill>
+          </a:ln>
+        </p:spPr>
+        <p:style>
+          <a:lnRef idx="1">
+            <a:schemeClr val="accent1"/>
+          </a:lnRef>
+          <a:fillRef idx="0">
+            <a:schemeClr val="accent1"/>
+          </a:fillRef>
+          <a:effectRef idx="0">
+            <a:schemeClr val="accent1"/>
+          </a:effectRef>
+          <a:fontRef idx="minor">
+            <a:schemeClr val="tx1"/>
+          </a:fontRef>
+        </p:style>
+      </p:cxnSp>
+      <p:sp>
+        <p:nvSpPr>
+          <p:cNvPr id="38" name="CuadroTexto 37"/>
+          <p:cNvSpPr txBox="1"/>
+          <p:nvPr/>
+        </p:nvSpPr>
+        <p:spPr>
+          <a:xfrm>
+            <a:off x="5022593" y="3485550"/>
+            <a:ext cx="312906" cy="369332"/>
+          </a:xfrm>
+          <a:prstGeom prst="rect">
+            <a:avLst/>
+          </a:prstGeom>
+          <a:noFill/>
+        </p:spPr>
+        <p:txBody>
+          <a:bodyPr wrap="none" rtlCol="0">
+            <a:spAutoFit/>
+          </a:bodyPr>
+          <a:lstStyle/>
+          <a:p>
+            <a:r>
+              <a:rPr lang="es-ES" dirty="0" smtClean="0">
+                <a:latin typeface="Arial" panose="020B0604020202020204" pitchFamily="34" charset="0"/>
+                <a:cs typeface="Arial" panose="020B0604020202020204" pitchFamily="34" charset="0"/>
+              </a:rPr>
+              <a:t>1</a:t>
+            </a:r>
+            <a:endParaRPr lang="en-US" dirty="0">
+              <a:latin typeface="Arial" panose="020B0604020202020204" pitchFamily="34" charset="0"/>
+              <a:cs typeface="Arial" panose="020B0604020202020204" pitchFamily="34" charset="0"/>
+            </a:endParaRPr>
+          </a:p>
+        </p:txBody>
+      </p:sp>
+      <p:sp>
+        <p:nvSpPr>
+          <p:cNvPr id="42" name="Rectángulo 41"/>
+          <p:cNvSpPr/>
+          <p:nvPr/>
+        </p:nvSpPr>
+        <p:spPr>
+          <a:xfrm>
+            <a:off x="4528781" y="5088551"/>
+            <a:ext cx="412192" cy="442361"/>
+          </a:xfrm>
+          <a:prstGeom prst="rect">
+            <a:avLst/>
+          </a:prstGeom>
+          <a:solidFill>
+            <a:srgbClr val="D5E8D4"/>
+          </a:solidFill>
+          <a:ln>
+            <a:solidFill>
+              <a:srgbClr val="96BF80"/>
+            </a:solidFill>
+          </a:ln>
+        </p:spPr>
+        <p:style>
+          <a:lnRef idx="2">
+            <a:schemeClr val="accent1">
+              <a:shade val="50000"/>
+            </a:schemeClr>
+          </a:lnRef>
+          <a:fillRef idx="1">
+            <a:schemeClr val="accent1"/>
+          </a:fillRef>
+          <a:effectRef idx="0">
+            <a:schemeClr val="accent1"/>
+          </a:effectRef>
+          <a:fontRef idx="minor">
+            <a:schemeClr val="lt1"/>
+          </a:fontRef>
+        </p:style>
+        <p:txBody>
+          <a:bodyPr rtlCol="0" anchor="ctr"/>
+          <a:lstStyle/>
+          <a:p>
+            <a:pPr algn="ctr"/>
+            <a:r>
+              <a:rPr lang="es-ES" dirty="0" smtClean="0">
+                <a:solidFill>
+                  <a:schemeClr val="tx1"/>
+                </a:solidFill>
+                <a:latin typeface="Arial" panose="020B0604020202020204" pitchFamily="34" charset="0"/>
+                <a:cs typeface="Arial" panose="020B0604020202020204" pitchFamily="34" charset="0"/>
+              </a:rPr>
+              <a:t>M</a:t>
+            </a:r>
+            <a:endParaRPr lang="en-US" dirty="0">
+              <a:solidFill>
+                <a:schemeClr val="tx1"/>
+              </a:solidFill>
+              <a:latin typeface="Arial" panose="020B0604020202020204" pitchFamily="34" charset="0"/>
+              <a:cs typeface="Arial" panose="020B0604020202020204" pitchFamily="34" charset="0"/>
+            </a:endParaRPr>
+          </a:p>
+        </p:txBody>
+      </p:sp>
+      <p:sp>
+        <p:nvSpPr>
+          <p:cNvPr id="43" name="Elipse 42"/>
+          <p:cNvSpPr/>
+          <p:nvPr/>
+        </p:nvSpPr>
+        <p:spPr>
+          <a:xfrm>
+            <a:off x="4940973" y="3995346"/>
+            <a:ext cx="631767" cy="515389"/>
+          </a:xfrm>
+          <a:prstGeom prst="ellipse">
+            <a:avLst/>
+          </a:prstGeom>
+          <a:solidFill>
+            <a:srgbClr val="D5E8D4"/>
+          </a:solidFill>
+          <a:ln>
+            <a:solidFill>
+              <a:srgbClr val="96BF80"/>
+            </a:solidFill>
+          </a:ln>
+        </p:spPr>
+        <p:style>
+          <a:lnRef idx="2">
+            <a:schemeClr val="accent1">
+              <a:shade val="50000"/>
+            </a:schemeClr>
+          </a:lnRef>
+          <a:fillRef idx="1">
+            <a:schemeClr val="accent1"/>
+          </a:fillRef>
+          <a:effectRef idx="0">
+            <a:schemeClr val="accent1"/>
+          </a:effectRef>
+          <a:fontRef idx="minor">
+            <a:schemeClr val="lt1"/>
+          </a:fontRef>
+        </p:style>
+        <p:txBody>
+          <a:bodyPr rtlCol="0" anchor="ctr"/>
+          <a:lstStyle/>
+          <a:p>
+            <a:pPr algn="ctr"/>
+            <a:r>
+              <a:rPr lang="es-ES" dirty="0">
+                <a:solidFill>
+                  <a:schemeClr val="tx1"/>
+                </a:solidFill>
+                <a:latin typeface="Arial" panose="020B0604020202020204" pitchFamily="34" charset="0"/>
+                <a:cs typeface="Arial" panose="020B0604020202020204" pitchFamily="34" charset="0"/>
+              </a:rPr>
+              <a:t>O</a:t>
+            </a:r>
+            <a:endParaRPr lang="en-US" dirty="0">
+              <a:solidFill>
+                <a:schemeClr val="tx1"/>
+              </a:solidFill>
+              <a:latin typeface="Arial" panose="020B0604020202020204" pitchFamily="34" charset="0"/>
+              <a:cs typeface="Arial" panose="020B0604020202020204" pitchFamily="34" charset="0"/>
+            </a:endParaRPr>
+          </a:p>
+        </p:txBody>
+      </p:sp>
+      <p:cxnSp>
+        <p:nvCxnSpPr>
+          <p:cNvPr id="46" name="Conector recto 45"/>
+          <p:cNvCxnSpPr>
+            <a:stCxn id="43" idx="4"/>
+            <a:endCxn id="42" idx="0"/>
+          </p:cNvCxnSpPr>
+          <p:nvPr/>
+        </p:nvCxnSpPr>
+        <p:spPr>
+          <a:xfrm flipH="1">
+            <a:off x="4734877" y="4510735"/>
+            <a:ext cx="521980" cy="577816"/>
+          </a:xfrm>
+          <a:prstGeom prst="line">
+            <a:avLst/>
+          </a:prstGeom>
+          <a:ln>
+            <a:solidFill>
+              <a:schemeClr val="tx1"/>
+            </a:solidFill>
+          </a:ln>
+        </p:spPr>
+        <p:style>
+          <a:lnRef idx="1">
+            <a:schemeClr val="accent1"/>
+          </a:lnRef>
+          <a:fillRef idx="0">
+            <a:schemeClr val="accent1"/>
+          </a:fillRef>
+          <a:effectRef idx="0">
+            <a:schemeClr val="accent1"/>
+          </a:effectRef>
+          <a:fontRef idx="minor">
+            <a:schemeClr val="tx1"/>
+          </a:fontRef>
+        </p:style>
+      </p:cxnSp>
+      <p:sp>
+        <p:nvSpPr>
+          <p:cNvPr id="47" name="CuadroTexto 46"/>
+          <p:cNvSpPr txBox="1"/>
+          <p:nvPr/>
+        </p:nvSpPr>
+        <p:spPr>
+          <a:xfrm>
+            <a:off x="4745913" y="4529015"/>
+            <a:ext cx="312906" cy="369332"/>
+          </a:xfrm>
+          <a:prstGeom prst="rect">
+            <a:avLst/>
+          </a:prstGeom>
+          <a:noFill/>
+        </p:spPr>
+        <p:txBody>
+          <a:bodyPr wrap="square" rtlCol="0">
+            <a:spAutoFit/>
+          </a:bodyPr>
+          <a:lstStyle/>
+          <a:p>
+            <a:r>
+              <a:rPr lang="es-ES" dirty="0">
+                <a:latin typeface="Arial" panose="020B0604020202020204" pitchFamily="34" charset="0"/>
+                <a:cs typeface="Arial" panose="020B0604020202020204" pitchFamily="34" charset="0"/>
+              </a:rPr>
+              <a:t>0</a:t>
+            </a:r>
+            <a:endParaRPr lang="en-US" dirty="0">
+              <a:latin typeface="Arial" panose="020B0604020202020204" pitchFamily="34" charset="0"/>
+              <a:cs typeface="Arial" panose="020B0604020202020204" pitchFamily="34" charset="0"/>
+            </a:endParaRPr>
+          </a:p>
+        </p:txBody>
+      </p:sp>
+      <p:cxnSp>
+        <p:nvCxnSpPr>
+          <p:cNvPr id="55" name="Conector recto 54"/>
+          <p:cNvCxnSpPr>
+            <a:stCxn id="6" idx="4"/>
+            <a:endCxn id="77" idx="0"/>
+          </p:cNvCxnSpPr>
+          <p:nvPr/>
+        </p:nvCxnSpPr>
+        <p:spPr>
+          <a:xfrm flipH="1">
+            <a:off x="3749136" y="2115519"/>
+            <a:ext cx="735362" cy="781335"/>
+          </a:xfrm>
+          <a:prstGeom prst="line">
+            <a:avLst/>
+          </a:prstGeom>
+          <a:ln>
+            <a:solidFill>
+              <a:schemeClr val="tx1"/>
+            </a:solidFill>
+          </a:ln>
+        </p:spPr>
+        <p:style>
+          <a:lnRef idx="1">
+            <a:schemeClr val="accent1"/>
+          </a:lnRef>
+          <a:fillRef idx="0">
+            <a:schemeClr val="accent1"/>
+          </a:fillRef>
+          <a:effectRef idx="0">
+            <a:schemeClr val="accent1"/>
+          </a:effectRef>
+          <a:fontRef idx="minor">
+            <a:schemeClr val="tx1"/>
+          </a:fontRef>
+        </p:style>
+      </p:cxnSp>
+      <p:sp>
+        <p:nvSpPr>
+          <p:cNvPr id="56" name="CuadroTexto 55"/>
+          <p:cNvSpPr txBox="1"/>
+          <p:nvPr/>
+        </p:nvSpPr>
+        <p:spPr>
+          <a:xfrm>
+            <a:off x="3886404" y="2272624"/>
+            <a:ext cx="312906" cy="369332"/>
+          </a:xfrm>
+          <a:prstGeom prst="rect">
+            <a:avLst/>
+          </a:prstGeom>
+          <a:noFill/>
+        </p:spPr>
+        <p:txBody>
+          <a:bodyPr wrap="square" rtlCol="0">
+            <a:spAutoFit/>
+          </a:bodyPr>
+          <a:lstStyle/>
+          <a:p>
+            <a:r>
+              <a:rPr lang="es-ES" dirty="0">
+                <a:latin typeface="Arial" panose="020B0604020202020204" pitchFamily="34" charset="0"/>
+                <a:cs typeface="Arial" panose="020B0604020202020204" pitchFamily="34" charset="0"/>
+              </a:rPr>
+              <a:t>0</a:t>
+            </a:r>
+            <a:endParaRPr lang="en-US" dirty="0">
+              <a:latin typeface="Arial" panose="020B0604020202020204" pitchFamily="34" charset="0"/>
+              <a:cs typeface="Arial" panose="020B0604020202020204" pitchFamily="34" charset="0"/>
+            </a:endParaRPr>
+          </a:p>
+        </p:txBody>
+      </p:sp>
+      <p:cxnSp>
+        <p:nvCxnSpPr>
+          <p:cNvPr id="71" name="Conector recto 70"/>
+          <p:cNvCxnSpPr>
+            <a:stCxn id="14" idx="0"/>
+            <a:endCxn id="11" idx="4"/>
+          </p:cNvCxnSpPr>
+          <p:nvPr/>
+        </p:nvCxnSpPr>
+        <p:spPr>
+          <a:xfrm flipV="1">
+            <a:off x="6314528" y="2237912"/>
+            <a:ext cx="521980" cy="640222"/>
+          </a:xfrm>
+          <a:prstGeom prst="line">
+            <a:avLst/>
+          </a:prstGeom>
+          <a:ln>
+            <a:solidFill>
+              <a:schemeClr val="tx1"/>
+            </a:solidFill>
+          </a:ln>
+        </p:spPr>
+        <p:style>
+          <a:lnRef idx="1">
+            <a:schemeClr val="accent1"/>
+          </a:lnRef>
+          <a:fillRef idx="0">
+            <a:schemeClr val="accent1"/>
+          </a:fillRef>
+          <a:effectRef idx="0">
+            <a:schemeClr val="accent1"/>
+          </a:effectRef>
+          <a:fontRef idx="minor">
+            <a:schemeClr val="tx1"/>
+          </a:fontRef>
+        </p:style>
+      </p:cxnSp>
+      <p:sp>
+        <p:nvSpPr>
+          <p:cNvPr id="75" name="CuadroTexto 74"/>
+          <p:cNvSpPr txBox="1"/>
+          <p:nvPr/>
+        </p:nvSpPr>
+        <p:spPr>
+          <a:xfrm>
+            <a:off x="6304259" y="2337789"/>
+            <a:ext cx="312906" cy="369332"/>
+          </a:xfrm>
+          <a:prstGeom prst="rect">
+            <a:avLst/>
+          </a:prstGeom>
+          <a:noFill/>
+        </p:spPr>
+        <p:txBody>
+          <a:bodyPr wrap="none" rtlCol="0">
+            <a:spAutoFit/>
+          </a:bodyPr>
+          <a:lstStyle/>
+          <a:p>
+            <a:r>
+              <a:rPr lang="es-ES" dirty="0">
+                <a:latin typeface="Arial" panose="020B0604020202020204" pitchFamily="34" charset="0"/>
+                <a:cs typeface="Arial" panose="020B0604020202020204" pitchFamily="34" charset="0"/>
+              </a:rPr>
+              <a:t>0</a:t>
+            </a:r>
+            <a:endParaRPr lang="en-US" dirty="0">
+              <a:latin typeface="Arial" panose="020B0604020202020204" pitchFamily="34" charset="0"/>
+              <a:cs typeface="Arial" panose="020B0604020202020204" pitchFamily="34" charset="0"/>
+            </a:endParaRPr>
+          </a:p>
+        </p:txBody>
+      </p:sp>
+      <p:sp>
+        <p:nvSpPr>
+          <p:cNvPr id="76" name="Rectángulo 75"/>
+          <p:cNvSpPr/>
+          <p:nvPr/>
+        </p:nvSpPr>
+        <p:spPr>
+          <a:xfrm>
+            <a:off x="3806578" y="4031859"/>
+            <a:ext cx="412192" cy="442361"/>
+          </a:xfrm>
+          <a:prstGeom prst="rect">
+            <a:avLst/>
+          </a:prstGeom>
+          <a:solidFill>
+            <a:srgbClr val="D5E8D4"/>
+          </a:solidFill>
+          <a:ln>
+            <a:solidFill>
+              <a:srgbClr val="96BF80"/>
+            </a:solidFill>
+          </a:ln>
+        </p:spPr>
+        <p:style>
+          <a:lnRef idx="2">
+            <a:schemeClr val="accent1">
+              <a:shade val="50000"/>
+            </a:schemeClr>
+          </a:lnRef>
+          <a:fillRef idx="1">
+            <a:schemeClr val="accent1"/>
+          </a:fillRef>
+          <a:effectRef idx="0">
+            <a:schemeClr val="accent1"/>
+          </a:effectRef>
+          <a:fontRef idx="minor">
+            <a:schemeClr val="lt1"/>
+          </a:fontRef>
+        </p:style>
+        <p:txBody>
+          <a:bodyPr rtlCol="0" anchor="ctr"/>
+          <a:lstStyle/>
+          <a:p>
+            <a:pPr algn="ctr"/>
+            <a:r>
+              <a:rPr lang="es-ES" dirty="0" smtClean="0">
+                <a:solidFill>
+                  <a:schemeClr val="tx1"/>
+                </a:solidFill>
+                <a:latin typeface="Arial" panose="020B0604020202020204" pitchFamily="34" charset="0"/>
+                <a:cs typeface="Arial" panose="020B0604020202020204" pitchFamily="34" charset="0"/>
+              </a:rPr>
+              <a:t>E</a:t>
+            </a:r>
+            <a:endParaRPr lang="en-US" dirty="0">
+              <a:solidFill>
+                <a:schemeClr val="tx1"/>
+              </a:solidFill>
+              <a:latin typeface="Arial" panose="020B0604020202020204" pitchFamily="34" charset="0"/>
+              <a:cs typeface="Arial" panose="020B0604020202020204" pitchFamily="34" charset="0"/>
+            </a:endParaRPr>
+          </a:p>
+        </p:txBody>
+      </p:sp>
+      <p:sp>
+        <p:nvSpPr>
+          <p:cNvPr id="77" name="Elipse 76"/>
+          <p:cNvSpPr/>
+          <p:nvPr/>
+        </p:nvSpPr>
+        <p:spPr>
+          <a:xfrm>
+            <a:off x="3433252" y="2896854"/>
+            <a:ext cx="631767" cy="515389"/>
+          </a:xfrm>
+          <a:prstGeom prst="ellipse">
+            <a:avLst/>
+          </a:prstGeom>
+          <a:solidFill>
+            <a:srgbClr val="D5E8D4"/>
+          </a:solidFill>
+          <a:ln>
+            <a:solidFill>
+              <a:srgbClr val="96BF80"/>
+            </a:solidFill>
+          </a:ln>
+        </p:spPr>
+        <p:style>
+          <a:lnRef idx="2">
+            <a:schemeClr val="accent1">
+              <a:shade val="50000"/>
+            </a:schemeClr>
+          </a:lnRef>
+          <a:fillRef idx="1">
+            <a:schemeClr val="accent1"/>
+          </a:fillRef>
+          <a:effectRef idx="0">
+            <a:schemeClr val="accent1"/>
+          </a:effectRef>
+          <a:fontRef idx="minor">
+            <a:schemeClr val="lt1"/>
+          </a:fontRef>
+        </p:style>
+        <p:txBody>
+          <a:bodyPr rtlCol="0" anchor="ctr"/>
+          <a:lstStyle/>
+          <a:p>
+            <a:pPr algn="ctr"/>
+            <a:r>
+              <a:rPr lang="es-ES" dirty="0" smtClean="0">
+                <a:solidFill>
+                  <a:schemeClr val="tx1"/>
+                </a:solidFill>
+                <a:latin typeface="Arial" panose="020B0604020202020204" pitchFamily="34" charset="0"/>
+                <a:cs typeface="Arial" panose="020B0604020202020204" pitchFamily="34" charset="0"/>
+              </a:rPr>
+              <a:t>A</a:t>
+            </a:r>
+            <a:endParaRPr lang="en-US" dirty="0">
+              <a:solidFill>
+                <a:schemeClr val="tx1"/>
+              </a:solidFill>
+              <a:latin typeface="Arial" panose="020B0604020202020204" pitchFamily="34" charset="0"/>
+              <a:cs typeface="Arial" panose="020B0604020202020204" pitchFamily="34" charset="0"/>
+            </a:endParaRPr>
+          </a:p>
+        </p:txBody>
+      </p:sp>
+      <p:cxnSp>
+        <p:nvCxnSpPr>
+          <p:cNvPr id="88" name="Conector recto 87"/>
+          <p:cNvCxnSpPr>
+            <a:stCxn id="76" idx="0"/>
+            <a:endCxn id="77" idx="4"/>
+          </p:cNvCxnSpPr>
+          <p:nvPr/>
+        </p:nvCxnSpPr>
+        <p:spPr>
+          <a:xfrm flipH="1" flipV="1">
+            <a:off x="3749136" y="3412243"/>
+            <a:ext cx="263538" cy="619616"/>
+          </a:xfrm>
+          <a:prstGeom prst="line">
+            <a:avLst/>
+          </a:prstGeom>
+          <a:ln>
+            <a:solidFill>
+              <a:schemeClr val="tx1"/>
+            </a:solidFill>
+          </a:ln>
+        </p:spPr>
+        <p:style>
+          <a:lnRef idx="1">
+            <a:schemeClr val="accent1"/>
+          </a:lnRef>
+          <a:fillRef idx="0">
+            <a:schemeClr val="accent1"/>
+          </a:fillRef>
+          <a:effectRef idx="0">
+            <a:schemeClr val="accent1"/>
+          </a:effectRef>
+          <a:fontRef idx="minor">
+            <a:schemeClr val="tx1"/>
+          </a:fontRef>
+        </p:style>
+      </p:cxnSp>
+      <p:sp>
+        <p:nvSpPr>
+          <p:cNvPr id="89" name="CuadroTexto 88"/>
+          <p:cNvSpPr txBox="1"/>
+          <p:nvPr/>
+        </p:nvSpPr>
+        <p:spPr>
+          <a:xfrm>
+            <a:off x="3806578" y="3482475"/>
+            <a:ext cx="312906" cy="369332"/>
+          </a:xfrm>
+          <a:prstGeom prst="rect">
+            <a:avLst/>
+          </a:prstGeom>
+          <a:noFill/>
+        </p:spPr>
+        <p:txBody>
+          <a:bodyPr wrap="square" rtlCol="0">
+            <a:spAutoFit/>
+          </a:bodyPr>
+          <a:lstStyle/>
+          <a:p>
+            <a:r>
+              <a:rPr lang="es-ES" dirty="0" smtClean="0">
+                <a:latin typeface="Arial" panose="020B0604020202020204" pitchFamily="34" charset="0"/>
+                <a:cs typeface="Arial" panose="020B0604020202020204" pitchFamily="34" charset="0"/>
+              </a:rPr>
+              <a:t>1</a:t>
+            </a:r>
+            <a:endParaRPr lang="en-US" dirty="0">
+              <a:latin typeface="Arial" panose="020B0604020202020204" pitchFamily="34" charset="0"/>
+              <a:cs typeface="Arial" panose="020B0604020202020204" pitchFamily="34" charset="0"/>
+            </a:endParaRPr>
+          </a:p>
+        </p:txBody>
+      </p:sp>
+      <p:sp>
+        <p:nvSpPr>
+          <p:cNvPr id="92" name="Rectángulo 91"/>
+          <p:cNvSpPr/>
+          <p:nvPr/>
+        </p:nvSpPr>
+        <p:spPr>
+          <a:xfrm>
+            <a:off x="5562937" y="5088550"/>
+            <a:ext cx="412192" cy="442361"/>
+          </a:xfrm>
+          <a:prstGeom prst="rect">
+            <a:avLst/>
+          </a:prstGeom>
+          <a:solidFill>
+            <a:srgbClr val="D5E8D4"/>
+          </a:solidFill>
+          <a:ln>
+            <a:solidFill>
+              <a:srgbClr val="96BF80"/>
+            </a:solidFill>
+          </a:ln>
+        </p:spPr>
+        <p:style>
+          <a:lnRef idx="2">
+            <a:schemeClr val="accent1">
+              <a:shade val="50000"/>
+            </a:schemeClr>
+          </a:lnRef>
+          <a:fillRef idx="1">
+            <a:schemeClr val="accent1"/>
+          </a:fillRef>
+          <a:effectRef idx="0">
+            <a:schemeClr val="accent1"/>
+          </a:effectRef>
+          <a:fontRef idx="minor">
+            <a:schemeClr val="lt1"/>
+          </a:fontRef>
+        </p:style>
+        <p:txBody>
+          <a:bodyPr rtlCol="0" anchor="ctr"/>
+          <a:lstStyle/>
+          <a:p>
+            <a:pPr algn="ctr"/>
+            <a:r>
+              <a:rPr lang="es-ES" dirty="0" smtClean="0">
+                <a:solidFill>
+                  <a:schemeClr val="tx1"/>
+                </a:solidFill>
+                <a:latin typeface="Arial" panose="020B0604020202020204" pitchFamily="34" charset="0"/>
+                <a:cs typeface="Arial" panose="020B0604020202020204" pitchFamily="34" charset="0"/>
+              </a:rPr>
+              <a:t>N</a:t>
+            </a:r>
+            <a:endParaRPr lang="en-US" dirty="0">
+              <a:solidFill>
+                <a:schemeClr val="tx1"/>
+              </a:solidFill>
+              <a:latin typeface="Arial" panose="020B0604020202020204" pitchFamily="34" charset="0"/>
+              <a:cs typeface="Arial" panose="020B0604020202020204" pitchFamily="34" charset="0"/>
+            </a:endParaRPr>
+          </a:p>
+        </p:txBody>
+      </p:sp>
+      <p:cxnSp>
+        <p:nvCxnSpPr>
+          <p:cNvPr id="94" name="Conector recto 93"/>
+          <p:cNvCxnSpPr>
+            <a:stCxn id="43" idx="4"/>
+            <a:endCxn id="92" idx="0"/>
+          </p:cNvCxnSpPr>
+          <p:nvPr/>
+        </p:nvCxnSpPr>
+        <p:spPr>
+          <a:xfrm>
+            <a:off x="5256857" y="4510735"/>
+            <a:ext cx="512176" cy="577815"/>
+          </a:xfrm>
+          <a:prstGeom prst="line">
+            <a:avLst/>
+          </a:prstGeom>
+          <a:ln>
+            <a:solidFill>
+              <a:schemeClr val="tx1"/>
+            </a:solidFill>
+          </a:ln>
+        </p:spPr>
+        <p:style>
+          <a:lnRef idx="1">
+            <a:schemeClr val="accent1"/>
+          </a:lnRef>
+          <a:fillRef idx="0">
+            <a:schemeClr val="accent1"/>
+          </a:fillRef>
+          <a:effectRef idx="0">
+            <a:schemeClr val="accent1"/>
+          </a:effectRef>
+          <a:fontRef idx="minor">
+            <a:schemeClr val="tx1"/>
+          </a:fontRef>
+        </p:style>
+      </p:cxnSp>
+    </p:spTree>
+    <p:extLst>
+      <p:ext uri="{BB962C8B-B14F-4D97-AF65-F5344CB8AC3E}">
+        <p14:creationId xmlns:p14="http://schemas.microsoft.com/office/powerpoint/2010/main" val="3898895195"/>
+      </p:ext>
+    </p:extLst>
+  </p:cSld>
+  <p:clrMapOvr>
+    <a:masterClrMapping/>
+  </p:clrMapOvr>
+</p:sld>
+</file>
+
+<file path=ppt/slides/slide4.xml><?xml version="1.0" encoding="utf-8"?>
+<p:sld xmlns:a="http://schemas.openxmlformats.org/drawingml/2006/main" xmlns:r="http://schemas.openxmlformats.org/officeDocument/2006/relationships" xmlns:p="http://schemas.openxmlformats.org/presentationml/2006/main">
+  <p:cSld>
+    <p:spTree>
+      <p:nvGrpSpPr>
+        <p:cNvPr id="1" name=""/>
+        <p:cNvGrpSpPr/>
+        <p:nvPr/>
+      </p:nvGrpSpPr>
+      <p:grpSpPr>
+        <a:xfrm>
+          <a:off x="0" y="0"/>
+          <a:ext cx="0" cy="0"/>
+          <a:chOff x="0" y="0"/>
+          <a:chExt cx="0" cy="0"/>
+        </a:xfrm>
+      </p:grpSpPr>
+      <p:sp>
+        <p:nvSpPr>
+          <p:cNvPr id="4" name="Elipse 3"/>
+          <p:cNvSpPr/>
+          <p:nvPr/>
+        </p:nvSpPr>
+        <p:spPr>
+          <a:xfrm>
+            <a:off x="5769033" y="382386"/>
+            <a:ext cx="631767" cy="515389"/>
+          </a:xfrm>
+          <a:prstGeom prst="ellipse">
+            <a:avLst/>
+          </a:prstGeom>
+          <a:solidFill>
+            <a:srgbClr val="D5E8D4"/>
+          </a:solidFill>
+          <a:ln>
+            <a:solidFill>
+              <a:srgbClr val="96BF80"/>
+            </a:solidFill>
+          </a:ln>
+        </p:spPr>
+        <p:style>
+          <a:lnRef idx="2">
+            <a:schemeClr val="accent1">
+              <a:shade val="50000"/>
+            </a:schemeClr>
+          </a:lnRef>
+          <a:fillRef idx="1">
+            <a:schemeClr val="accent1"/>
+          </a:fillRef>
+          <a:effectRef idx="0">
+            <a:schemeClr val="accent1"/>
+          </a:effectRef>
+          <a:fontRef idx="minor">
+            <a:schemeClr val="lt1"/>
+          </a:fontRef>
+        </p:style>
+        <p:txBody>
+          <a:bodyPr rtlCol="0" anchor="ctr"/>
+          <a:lstStyle/>
+          <a:p>
+            <a:pPr algn="ctr"/>
+            <a:r>
+              <a:rPr lang="es-ES" dirty="0" smtClean="0">
+                <a:solidFill>
+                  <a:schemeClr val="tx1"/>
+                </a:solidFill>
+                <a:latin typeface="Arial" panose="020B0604020202020204" pitchFamily="34" charset="0"/>
+                <a:cs typeface="Arial" panose="020B0604020202020204" pitchFamily="34" charset="0"/>
+              </a:rPr>
+              <a:t>1</a:t>
+            </a:r>
+            <a:endParaRPr lang="en-US" dirty="0">
+              <a:solidFill>
+                <a:schemeClr val="tx1"/>
+              </a:solidFill>
+              <a:latin typeface="Arial" panose="020B0604020202020204" pitchFamily="34" charset="0"/>
+              <a:cs typeface="Arial" panose="020B0604020202020204" pitchFamily="34" charset="0"/>
+            </a:endParaRPr>
+          </a:p>
+        </p:txBody>
+      </p:sp>
+      <p:sp>
+        <p:nvSpPr>
+          <p:cNvPr id="6" name="Elipse 5"/>
+          <p:cNvSpPr/>
+          <p:nvPr/>
+        </p:nvSpPr>
+        <p:spPr>
+          <a:xfrm>
+            <a:off x="3826696" y="1705758"/>
+            <a:ext cx="758668" cy="500406"/>
+          </a:xfrm>
+          <a:prstGeom prst="ellipse">
+            <a:avLst/>
+          </a:prstGeom>
+          <a:solidFill>
+            <a:srgbClr val="D5E8D4"/>
+          </a:solidFill>
+          <a:ln>
+            <a:solidFill>
+              <a:srgbClr val="96BF80"/>
+            </a:solidFill>
+          </a:ln>
+        </p:spPr>
+        <p:style>
+          <a:lnRef idx="2">
+            <a:schemeClr val="accent1">
+              <a:shade val="50000"/>
+            </a:schemeClr>
+          </a:lnRef>
+          <a:fillRef idx="1">
+            <a:schemeClr val="accent1"/>
+          </a:fillRef>
+          <a:effectRef idx="0">
+            <a:schemeClr val="accent1"/>
+          </a:effectRef>
+          <a:fontRef idx="minor">
+            <a:schemeClr val="lt1"/>
+          </a:fontRef>
+        </p:style>
+        <p:txBody>
+          <a:bodyPr rtlCol="0" anchor="ctr"/>
+          <a:lstStyle/>
+          <a:p>
+            <a:pPr algn="ctr"/>
+            <a:r>
+              <a:rPr lang="es-ES" dirty="0" smtClean="0">
+                <a:solidFill>
+                  <a:schemeClr val="tx1"/>
+                </a:solidFill>
+                <a:latin typeface="Arial" panose="020B0604020202020204" pitchFamily="34" charset="0"/>
+                <a:cs typeface="Arial" panose="020B0604020202020204" pitchFamily="34" charset="0"/>
+              </a:rPr>
+              <a:t>1/2</a:t>
+            </a:r>
+            <a:endParaRPr lang="en-US" dirty="0">
+              <a:solidFill>
+                <a:schemeClr val="tx1"/>
+              </a:solidFill>
+              <a:latin typeface="Arial" panose="020B0604020202020204" pitchFamily="34" charset="0"/>
+              <a:cs typeface="Arial" panose="020B0604020202020204" pitchFamily="34" charset="0"/>
+            </a:endParaRPr>
+          </a:p>
+        </p:txBody>
+      </p:sp>
+      <p:cxnSp>
+        <p:nvCxnSpPr>
+          <p:cNvPr id="8" name="Conector recto 7"/>
+          <p:cNvCxnSpPr>
+            <a:stCxn id="4" idx="4"/>
+            <a:endCxn id="33" idx="0"/>
+          </p:cNvCxnSpPr>
+          <p:nvPr/>
+        </p:nvCxnSpPr>
+        <p:spPr>
+          <a:xfrm>
+            <a:off x="6084917" y="897775"/>
+            <a:ext cx="1901911" cy="807983"/>
+          </a:xfrm>
+          <a:prstGeom prst="line">
+            <a:avLst/>
+          </a:prstGeom>
+          <a:ln>
+            <a:solidFill>
+              <a:schemeClr val="tx1"/>
+            </a:solidFill>
+          </a:ln>
+        </p:spPr>
+        <p:style>
+          <a:lnRef idx="1">
+            <a:schemeClr val="accent1"/>
+          </a:lnRef>
+          <a:fillRef idx="0">
+            <a:schemeClr val="accent1"/>
+          </a:fillRef>
+          <a:effectRef idx="0">
+            <a:schemeClr val="accent1"/>
+          </a:effectRef>
+          <a:fontRef idx="minor">
+            <a:schemeClr val="tx1"/>
+          </a:fontRef>
+        </p:style>
+      </p:cxnSp>
+      <p:cxnSp>
+        <p:nvCxnSpPr>
+          <p:cNvPr id="12" name="Conector recto 11"/>
+          <p:cNvCxnSpPr>
+            <a:stCxn id="4" idx="4"/>
+            <a:endCxn id="6" idx="0"/>
+          </p:cNvCxnSpPr>
+          <p:nvPr/>
+        </p:nvCxnSpPr>
+        <p:spPr>
+          <a:xfrm flipH="1">
+            <a:off x="4206030" y="897775"/>
+            <a:ext cx="1878887" cy="807983"/>
+          </a:xfrm>
+          <a:prstGeom prst="line">
+            <a:avLst/>
+          </a:prstGeom>
+          <a:ln>
+            <a:solidFill>
+              <a:schemeClr val="tx1"/>
+            </a:solidFill>
+          </a:ln>
+        </p:spPr>
+        <p:style>
+          <a:lnRef idx="1">
+            <a:schemeClr val="accent1"/>
+          </a:lnRef>
+          <a:fillRef idx="0">
+            <a:schemeClr val="accent1"/>
+          </a:fillRef>
+          <a:effectRef idx="0">
+            <a:schemeClr val="accent1"/>
+          </a:effectRef>
+          <a:fontRef idx="minor">
+            <a:schemeClr val="tx1"/>
+          </a:fontRef>
+        </p:style>
+      </p:cxnSp>
+      <p:sp>
+        <p:nvSpPr>
+          <p:cNvPr id="13" name="CuadroTexto 12"/>
+          <p:cNvSpPr txBox="1"/>
+          <p:nvPr/>
+        </p:nvSpPr>
+        <p:spPr>
+          <a:xfrm>
+            <a:off x="6934508" y="1029547"/>
+            <a:ext cx="312906" cy="369332"/>
+          </a:xfrm>
+          <a:prstGeom prst="rect">
+            <a:avLst/>
+          </a:prstGeom>
+          <a:noFill/>
+        </p:spPr>
+        <p:txBody>
+          <a:bodyPr wrap="none" rtlCol="0">
+            <a:spAutoFit/>
+          </a:bodyPr>
+          <a:lstStyle/>
+          <a:p>
+            <a:r>
+              <a:rPr lang="es-ES" dirty="0" smtClean="0">
+                <a:latin typeface="Arial" panose="020B0604020202020204" pitchFamily="34" charset="0"/>
+                <a:cs typeface="Arial" panose="020B0604020202020204" pitchFamily="34" charset="0"/>
+              </a:rPr>
+              <a:t>1</a:t>
+            </a:r>
+            <a:endParaRPr lang="en-US" dirty="0">
+              <a:latin typeface="Arial" panose="020B0604020202020204" pitchFamily="34" charset="0"/>
+              <a:cs typeface="Arial" panose="020B0604020202020204" pitchFamily="34" charset="0"/>
+            </a:endParaRPr>
+          </a:p>
+        </p:txBody>
+      </p:sp>
+      <p:sp>
+        <p:nvSpPr>
+          <p:cNvPr id="23" name="CuadroTexto 22"/>
+          <p:cNvSpPr txBox="1"/>
+          <p:nvPr/>
+        </p:nvSpPr>
+        <p:spPr>
+          <a:xfrm>
+            <a:off x="5025759" y="964952"/>
+            <a:ext cx="454631" cy="369332"/>
+          </a:xfrm>
+          <a:prstGeom prst="rect">
+            <a:avLst/>
+          </a:prstGeom>
+          <a:noFill/>
+        </p:spPr>
+        <p:txBody>
+          <a:bodyPr wrap="square" rtlCol="0">
+            <a:spAutoFit/>
+          </a:bodyPr>
+          <a:lstStyle/>
+          <a:p>
+            <a:r>
+              <a:rPr lang="es-ES" dirty="0">
+                <a:latin typeface="Arial" panose="020B0604020202020204" pitchFamily="34" charset="0"/>
+                <a:cs typeface="Arial" panose="020B0604020202020204" pitchFamily="34" charset="0"/>
+              </a:rPr>
+              <a:t>0</a:t>
+            </a:r>
+            <a:endParaRPr lang="en-US" dirty="0">
+              <a:latin typeface="Arial" panose="020B0604020202020204" pitchFamily="34" charset="0"/>
+              <a:cs typeface="Arial" panose="020B0604020202020204" pitchFamily="34" charset="0"/>
+            </a:endParaRPr>
+          </a:p>
+        </p:txBody>
+      </p:sp>
+      <p:cxnSp>
+        <p:nvCxnSpPr>
+          <p:cNvPr id="28" name="Conector recto 27"/>
+          <p:cNvCxnSpPr>
+            <a:stCxn id="35" idx="0"/>
+            <a:endCxn id="6" idx="4"/>
+          </p:cNvCxnSpPr>
+          <p:nvPr/>
+        </p:nvCxnSpPr>
+        <p:spPr>
+          <a:xfrm flipH="1" flipV="1">
+            <a:off x="4206030" y="2206164"/>
+            <a:ext cx="826124" cy="900406"/>
+          </a:xfrm>
+          <a:prstGeom prst="line">
+            <a:avLst/>
+          </a:prstGeom>
+          <a:ln>
+            <a:solidFill>
+              <a:schemeClr val="tx1"/>
+            </a:solidFill>
+          </a:ln>
+        </p:spPr>
+        <p:style>
+          <a:lnRef idx="1">
+            <a:schemeClr val="accent1"/>
+          </a:lnRef>
+          <a:fillRef idx="0">
+            <a:schemeClr val="accent1"/>
+          </a:fillRef>
+          <a:effectRef idx="0">
+            <a:schemeClr val="accent1"/>
+          </a:effectRef>
+          <a:fontRef idx="minor">
+            <a:schemeClr val="tx1"/>
+          </a:fontRef>
+        </p:style>
+      </p:cxnSp>
+      <p:cxnSp>
+        <p:nvCxnSpPr>
+          <p:cNvPr id="55" name="Conector recto 54"/>
+          <p:cNvCxnSpPr>
+            <a:stCxn id="6" idx="4"/>
+            <a:endCxn id="34" idx="0"/>
+          </p:cNvCxnSpPr>
+          <p:nvPr/>
+        </p:nvCxnSpPr>
+        <p:spPr>
+          <a:xfrm flipH="1">
+            <a:off x="3193586" y="2206164"/>
+            <a:ext cx="1012444" cy="914741"/>
+          </a:xfrm>
+          <a:prstGeom prst="line">
+            <a:avLst/>
+          </a:prstGeom>
+          <a:ln>
+            <a:solidFill>
+              <a:schemeClr val="tx1"/>
+            </a:solidFill>
+          </a:ln>
+        </p:spPr>
+        <p:style>
+          <a:lnRef idx="1">
+            <a:schemeClr val="accent1"/>
+          </a:lnRef>
+          <a:fillRef idx="0">
+            <a:schemeClr val="accent1"/>
+          </a:fillRef>
+          <a:effectRef idx="0">
+            <a:schemeClr val="accent1"/>
+          </a:effectRef>
+          <a:fontRef idx="minor">
+            <a:schemeClr val="tx1"/>
+          </a:fontRef>
+        </p:style>
+      </p:cxnSp>
+      <p:cxnSp>
+        <p:nvCxnSpPr>
+          <p:cNvPr id="71" name="Conector recto 70"/>
+          <p:cNvCxnSpPr>
+            <a:stCxn id="36" idx="0"/>
+            <a:endCxn id="33" idx="4"/>
+          </p:cNvCxnSpPr>
+          <p:nvPr/>
+        </p:nvCxnSpPr>
+        <p:spPr>
+          <a:xfrm flipV="1">
+            <a:off x="7061638" y="2206164"/>
+            <a:ext cx="925190" cy="919424"/>
+          </a:xfrm>
+          <a:prstGeom prst="line">
+            <a:avLst/>
+          </a:prstGeom>
+          <a:ln>
+            <a:solidFill>
+              <a:schemeClr val="tx1"/>
+            </a:solidFill>
+          </a:ln>
+        </p:spPr>
+        <p:style>
+          <a:lnRef idx="1">
+            <a:schemeClr val="accent1"/>
+          </a:lnRef>
+          <a:fillRef idx="0">
+            <a:schemeClr val="accent1"/>
+          </a:fillRef>
+          <a:effectRef idx="0">
+            <a:schemeClr val="accent1"/>
+          </a:effectRef>
+          <a:fontRef idx="minor">
+            <a:schemeClr val="tx1"/>
+          </a:fontRef>
+        </p:style>
+      </p:cxnSp>
+      <p:sp>
+        <p:nvSpPr>
+          <p:cNvPr id="33" name="Elipse 32"/>
+          <p:cNvSpPr/>
+          <p:nvPr/>
+        </p:nvSpPr>
+        <p:spPr>
+          <a:xfrm>
+            <a:off x="7607494" y="1705758"/>
+            <a:ext cx="758668" cy="500406"/>
+          </a:xfrm>
+          <a:prstGeom prst="ellipse">
+            <a:avLst/>
+          </a:prstGeom>
+          <a:solidFill>
+            <a:srgbClr val="D5E8D4"/>
+          </a:solidFill>
+          <a:ln>
+            <a:solidFill>
+              <a:srgbClr val="96BF80"/>
+            </a:solidFill>
+          </a:ln>
+        </p:spPr>
+        <p:style>
+          <a:lnRef idx="2">
+            <a:schemeClr val="accent1">
+              <a:shade val="50000"/>
+            </a:schemeClr>
+          </a:lnRef>
+          <a:fillRef idx="1">
+            <a:schemeClr val="accent1"/>
+          </a:fillRef>
+          <a:effectRef idx="0">
+            <a:schemeClr val="accent1"/>
+          </a:effectRef>
+          <a:fontRef idx="minor">
+            <a:schemeClr val="lt1"/>
+          </a:fontRef>
+        </p:style>
+        <p:txBody>
+          <a:bodyPr rtlCol="0" anchor="ctr"/>
+          <a:lstStyle/>
+          <a:p>
+            <a:pPr algn="ctr"/>
+            <a:r>
+              <a:rPr lang="es-ES" dirty="0" smtClean="0">
+                <a:solidFill>
+                  <a:schemeClr val="tx1"/>
+                </a:solidFill>
+                <a:latin typeface="Arial" panose="020B0604020202020204" pitchFamily="34" charset="0"/>
+                <a:cs typeface="Arial" panose="020B0604020202020204" pitchFamily="34" charset="0"/>
+              </a:rPr>
+              <a:t>1/2</a:t>
+            </a:r>
+            <a:endParaRPr lang="en-US" dirty="0">
+              <a:solidFill>
+                <a:schemeClr val="tx1"/>
+              </a:solidFill>
+              <a:latin typeface="Arial" panose="020B0604020202020204" pitchFamily="34" charset="0"/>
+              <a:cs typeface="Arial" panose="020B0604020202020204" pitchFamily="34" charset="0"/>
+            </a:endParaRPr>
+          </a:p>
+        </p:txBody>
+      </p:sp>
+      <p:sp>
+        <p:nvSpPr>
+          <p:cNvPr id="34" name="Elipse 33"/>
+          <p:cNvSpPr/>
+          <p:nvPr/>
+        </p:nvSpPr>
+        <p:spPr>
+          <a:xfrm>
+            <a:off x="2814252" y="3120905"/>
+            <a:ext cx="758668" cy="500406"/>
+          </a:xfrm>
+          <a:prstGeom prst="ellipse">
+            <a:avLst/>
+          </a:prstGeom>
+          <a:solidFill>
+            <a:srgbClr val="D5E8D4"/>
+          </a:solidFill>
+          <a:ln>
+            <a:solidFill>
+              <a:srgbClr val="96BF80"/>
+            </a:solidFill>
+          </a:ln>
+        </p:spPr>
+        <p:style>
+          <a:lnRef idx="2">
+            <a:schemeClr val="accent1">
+              <a:shade val="50000"/>
+            </a:schemeClr>
+          </a:lnRef>
+          <a:fillRef idx="1">
+            <a:schemeClr val="accent1"/>
+          </a:fillRef>
+          <a:effectRef idx="0">
+            <a:schemeClr val="accent1"/>
+          </a:effectRef>
+          <a:fontRef idx="minor">
+            <a:schemeClr val="lt1"/>
+          </a:fontRef>
+        </p:style>
+        <p:txBody>
+          <a:bodyPr rtlCol="0" anchor="ctr"/>
+          <a:lstStyle/>
+          <a:p>
+            <a:pPr algn="ctr"/>
+            <a:r>
+              <a:rPr lang="es-ES" dirty="0" smtClean="0">
+                <a:solidFill>
+                  <a:schemeClr val="tx1"/>
+                </a:solidFill>
+                <a:latin typeface="Arial" panose="020B0604020202020204" pitchFamily="34" charset="0"/>
+                <a:cs typeface="Arial" panose="020B0604020202020204" pitchFamily="34" charset="0"/>
+              </a:rPr>
+              <a:t>1/4</a:t>
+            </a:r>
+            <a:endParaRPr lang="en-US" dirty="0">
+              <a:solidFill>
+                <a:schemeClr val="tx1"/>
+              </a:solidFill>
+              <a:latin typeface="Arial" panose="020B0604020202020204" pitchFamily="34" charset="0"/>
+              <a:cs typeface="Arial" panose="020B0604020202020204" pitchFamily="34" charset="0"/>
+            </a:endParaRPr>
+          </a:p>
+        </p:txBody>
+      </p:sp>
+      <p:sp>
+        <p:nvSpPr>
+          <p:cNvPr id="35" name="Elipse 34"/>
+          <p:cNvSpPr/>
+          <p:nvPr/>
+        </p:nvSpPr>
+        <p:spPr>
+          <a:xfrm>
+            <a:off x="4652820" y="3106570"/>
+            <a:ext cx="758668" cy="500406"/>
+          </a:xfrm>
+          <a:prstGeom prst="ellipse">
+            <a:avLst/>
+          </a:prstGeom>
+          <a:solidFill>
+            <a:srgbClr val="D5E8D4"/>
+          </a:solidFill>
+          <a:ln>
+            <a:solidFill>
+              <a:srgbClr val="96BF80"/>
+            </a:solidFill>
+          </a:ln>
+        </p:spPr>
+        <p:style>
+          <a:lnRef idx="2">
+            <a:schemeClr val="accent1">
+              <a:shade val="50000"/>
+            </a:schemeClr>
+          </a:lnRef>
+          <a:fillRef idx="1">
+            <a:schemeClr val="accent1"/>
+          </a:fillRef>
+          <a:effectRef idx="0">
+            <a:schemeClr val="accent1"/>
+          </a:effectRef>
+          <a:fontRef idx="minor">
+            <a:schemeClr val="lt1"/>
+          </a:fontRef>
+        </p:style>
+        <p:txBody>
+          <a:bodyPr rtlCol="0" anchor="ctr"/>
+          <a:lstStyle/>
+          <a:p>
+            <a:pPr algn="ctr"/>
+            <a:r>
+              <a:rPr lang="es-ES" dirty="0" smtClean="0">
+                <a:solidFill>
+                  <a:schemeClr val="tx1"/>
+                </a:solidFill>
+                <a:latin typeface="Arial" panose="020B0604020202020204" pitchFamily="34" charset="0"/>
+                <a:cs typeface="Arial" panose="020B0604020202020204" pitchFamily="34" charset="0"/>
+              </a:rPr>
+              <a:t>1/4</a:t>
+            </a:r>
+            <a:endParaRPr lang="en-US" dirty="0">
+              <a:solidFill>
+                <a:schemeClr val="tx1"/>
+              </a:solidFill>
+              <a:latin typeface="Arial" panose="020B0604020202020204" pitchFamily="34" charset="0"/>
+              <a:cs typeface="Arial" panose="020B0604020202020204" pitchFamily="34" charset="0"/>
+            </a:endParaRPr>
+          </a:p>
+        </p:txBody>
+      </p:sp>
+      <p:sp>
+        <p:nvSpPr>
+          <p:cNvPr id="36" name="Elipse 35"/>
+          <p:cNvSpPr/>
+          <p:nvPr/>
+        </p:nvSpPr>
+        <p:spPr>
+          <a:xfrm>
+            <a:off x="6682304" y="3125588"/>
+            <a:ext cx="758668" cy="500406"/>
+          </a:xfrm>
+          <a:prstGeom prst="ellipse">
+            <a:avLst/>
+          </a:prstGeom>
+          <a:solidFill>
+            <a:srgbClr val="D5E8D4"/>
+          </a:solidFill>
+          <a:ln>
+            <a:solidFill>
+              <a:srgbClr val="96BF80"/>
+            </a:solidFill>
+          </a:ln>
+        </p:spPr>
+        <p:style>
+          <a:lnRef idx="2">
+            <a:schemeClr val="accent1">
+              <a:shade val="50000"/>
+            </a:schemeClr>
+          </a:lnRef>
+          <a:fillRef idx="1">
+            <a:schemeClr val="accent1"/>
+          </a:fillRef>
+          <a:effectRef idx="0">
+            <a:schemeClr val="accent1"/>
+          </a:effectRef>
+          <a:fontRef idx="minor">
+            <a:schemeClr val="lt1"/>
+          </a:fontRef>
+        </p:style>
+        <p:txBody>
+          <a:bodyPr rtlCol="0" anchor="ctr"/>
+          <a:lstStyle/>
+          <a:p>
+            <a:pPr algn="ctr"/>
+            <a:r>
+              <a:rPr lang="es-ES" dirty="0" smtClean="0">
+                <a:solidFill>
+                  <a:schemeClr val="tx1"/>
+                </a:solidFill>
+                <a:latin typeface="Arial" panose="020B0604020202020204" pitchFamily="34" charset="0"/>
+                <a:cs typeface="Arial" panose="020B0604020202020204" pitchFamily="34" charset="0"/>
+              </a:rPr>
+              <a:t>1/4</a:t>
+            </a:r>
+            <a:endParaRPr lang="en-US" dirty="0">
+              <a:solidFill>
+                <a:schemeClr val="tx1"/>
+              </a:solidFill>
+              <a:latin typeface="Arial" panose="020B0604020202020204" pitchFamily="34" charset="0"/>
+              <a:cs typeface="Arial" panose="020B0604020202020204" pitchFamily="34" charset="0"/>
+            </a:endParaRPr>
+          </a:p>
+        </p:txBody>
+      </p:sp>
+      <p:sp>
+        <p:nvSpPr>
+          <p:cNvPr id="39" name="Elipse 38"/>
+          <p:cNvSpPr/>
+          <p:nvPr/>
+        </p:nvSpPr>
+        <p:spPr>
+          <a:xfrm>
+            <a:off x="8501628" y="3120905"/>
+            <a:ext cx="758668" cy="500406"/>
+          </a:xfrm>
+          <a:prstGeom prst="ellipse">
+            <a:avLst/>
+          </a:prstGeom>
+          <a:solidFill>
+            <a:srgbClr val="D5E8D4"/>
+          </a:solidFill>
+          <a:ln>
+            <a:solidFill>
+              <a:srgbClr val="96BF80"/>
+            </a:solidFill>
+          </a:ln>
+        </p:spPr>
+        <p:style>
+          <a:lnRef idx="2">
+            <a:schemeClr val="accent1">
+              <a:shade val="50000"/>
+            </a:schemeClr>
+          </a:lnRef>
+          <a:fillRef idx="1">
+            <a:schemeClr val="accent1"/>
+          </a:fillRef>
+          <a:effectRef idx="0">
+            <a:schemeClr val="accent1"/>
+          </a:effectRef>
+          <a:fontRef idx="minor">
+            <a:schemeClr val="lt1"/>
+          </a:fontRef>
+        </p:style>
+        <p:txBody>
+          <a:bodyPr rtlCol="0" anchor="ctr"/>
+          <a:lstStyle/>
+          <a:p>
+            <a:pPr algn="ctr"/>
+            <a:r>
+              <a:rPr lang="es-ES" dirty="0" smtClean="0">
+                <a:solidFill>
+                  <a:schemeClr val="tx1"/>
+                </a:solidFill>
+                <a:latin typeface="Arial" panose="020B0604020202020204" pitchFamily="34" charset="0"/>
+                <a:cs typeface="Arial" panose="020B0604020202020204" pitchFamily="34" charset="0"/>
+              </a:rPr>
+              <a:t>1/4</a:t>
+            </a:r>
+            <a:endParaRPr lang="en-US" dirty="0">
+              <a:solidFill>
+                <a:schemeClr val="tx1"/>
+              </a:solidFill>
+              <a:latin typeface="Arial" panose="020B0604020202020204" pitchFamily="34" charset="0"/>
+              <a:cs typeface="Arial" panose="020B0604020202020204" pitchFamily="34" charset="0"/>
+            </a:endParaRPr>
+          </a:p>
+        </p:txBody>
+      </p:sp>
+      <p:sp>
+        <p:nvSpPr>
+          <p:cNvPr id="40" name="Elipse 39"/>
+          <p:cNvSpPr/>
+          <p:nvPr/>
+        </p:nvSpPr>
+        <p:spPr>
+          <a:xfrm>
+            <a:off x="8243196" y="4596557"/>
+            <a:ext cx="758668" cy="500406"/>
+          </a:xfrm>
+          <a:prstGeom prst="ellipse">
+            <a:avLst/>
+          </a:prstGeom>
+          <a:solidFill>
+            <a:srgbClr val="D5E8D4"/>
+          </a:solidFill>
+          <a:ln>
+            <a:solidFill>
+              <a:srgbClr val="96BF80"/>
+            </a:solidFill>
+          </a:ln>
+        </p:spPr>
+        <p:style>
+          <a:lnRef idx="2">
+            <a:schemeClr val="accent1">
+              <a:shade val="50000"/>
+            </a:schemeClr>
+          </a:lnRef>
+          <a:fillRef idx="1">
+            <a:schemeClr val="accent1"/>
+          </a:fillRef>
+          <a:effectRef idx="0">
+            <a:schemeClr val="accent1"/>
+          </a:effectRef>
+          <a:fontRef idx="minor">
+            <a:schemeClr val="lt1"/>
+          </a:fontRef>
+        </p:style>
+        <p:txBody>
+          <a:bodyPr rtlCol="0" anchor="ctr"/>
+          <a:lstStyle/>
+          <a:p>
+            <a:pPr algn="ctr"/>
+            <a:r>
+              <a:rPr lang="es-ES" dirty="0" smtClean="0">
+                <a:solidFill>
+                  <a:schemeClr val="tx1"/>
+                </a:solidFill>
+                <a:latin typeface="Arial" panose="020B0604020202020204" pitchFamily="34" charset="0"/>
+                <a:cs typeface="Arial" panose="020B0604020202020204" pitchFamily="34" charset="0"/>
+              </a:rPr>
+              <a:t>1/8</a:t>
+            </a:r>
+            <a:endParaRPr lang="en-US" dirty="0">
+              <a:solidFill>
+                <a:schemeClr val="tx1"/>
+              </a:solidFill>
+              <a:latin typeface="Arial" panose="020B0604020202020204" pitchFamily="34" charset="0"/>
+              <a:cs typeface="Arial" panose="020B0604020202020204" pitchFamily="34" charset="0"/>
+            </a:endParaRPr>
+          </a:p>
+        </p:txBody>
+      </p:sp>
+      <p:sp>
+        <p:nvSpPr>
+          <p:cNvPr id="41" name="Elipse 40"/>
+          <p:cNvSpPr/>
+          <p:nvPr/>
+        </p:nvSpPr>
+        <p:spPr>
+          <a:xfrm>
+            <a:off x="9092192" y="4581217"/>
+            <a:ext cx="758668" cy="500406"/>
+          </a:xfrm>
+          <a:prstGeom prst="ellipse">
+            <a:avLst/>
+          </a:prstGeom>
+          <a:solidFill>
+            <a:srgbClr val="D5E8D4"/>
+          </a:solidFill>
+          <a:ln>
+            <a:solidFill>
+              <a:srgbClr val="96BF80"/>
+            </a:solidFill>
+          </a:ln>
+        </p:spPr>
+        <p:style>
+          <a:lnRef idx="2">
+            <a:schemeClr val="accent1">
+              <a:shade val="50000"/>
+            </a:schemeClr>
+          </a:lnRef>
+          <a:fillRef idx="1">
+            <a:schemeClr val="accent1"/>
+          </a:fillRef>
+          <a:effectRef idx="0">
+            <a:schemeClr val="accent1"/>
+          </a:effectRef>
+          <a:fontRef idx="minor">
+            <a:schemeClr val="lt1"/>
+          </a:fontRef>
+        </p:style>
+        <p:txBody>
+          <a:bodyPr rtlCol="0" anchor="ctr"/>
+          <a:lstStyle/>
+          <a:p>
+            <a:pPr algn="ctr"/>
+            <a:r>
+              <a:rPr lang="es-ES" dirty="0" smtClean="0">
+                <a:solidFill>
+                  <a:schemeClr val="tx1"/>
+                </a:solidFill>
+                <a:latin typeface="Arial" panose="020B0604020202020204" pitchFamily="34" charset="0"/>
+                <a:cs typeface="Arial" panose="020B0604020202020204" pitchFamily="34" charset="0"/>
+              </a:rPr>
+              <a:t>1/8</a:t>
+            </a:r>
+            <a:endParaRPr lang="en-US" dirty="0">
+              <a:solidFill>
+                <a:schemeClr val="tx1"/>
+              </a:solidFill>
+              <a:latin typeface="Arial" panose="020B0604020202020204" pitchFamily="34" charset="0"/>
+              <a:cs typeface="Arial" panose="020B0604020202020204" pitchFamily="34" charset="0"/>
+            </a:endParaRPr>
+          </a:p>
+        </p:txBody>
+      </p:sp>
+      <p:sp>
+        <p:nvSpPr>
+          <p:cNvPr id="44" name="Elipse 43"/>
+          <p:cNvSpPr/>
+          <p:nvPr/>
+        </p:nvSpPr>
+        <p:spPr>
+          <a:xfrm>
+            <a:off x="7105194" y="4619777"/>
+            <a:ext cx="758668" cy="500406"/>
+          </a:xfrm>
+          <a:prstGeom prst="ellipse">
+            <a:avLst/>
+          </a:prstGeom>
+          <a:solidFill>
+            <a:srgbClr val="D5E8D4"/>
+          </a:solidFill>
+          <a:ln>
+            <a:solidFill>
+              <a:srgbClr val="96BF80"/>
+            </a:solidFill>
+          </a:ln>
+        </p:spPr>
+        <p:style>
+          <a:lnRef idx="2">
+            <a:schemeClr val="accent1">
+              <a:shade val="50000"/>
+            </a:schemeClr>
+          </a:lnRef>
+          <a:fillRef idx="1">
+            <a:schemeClr val="accent1"/>
+          </a:fillRef>
+          <a:effectRef idx="0">
+            <a:schemeClr val="accent1"/>
+          </a:effectRef>
+          <a:fontRef idx="minor">
+            <a:schemeClr val="lt1"/>
+          </a:fontRef>
+        </p:style>
+        <p:txBody>
+          <a:bodyPr rtlCol="0" anchor="ctr"/>
+          <a:lstStyle/>
+          <a:p>
+            <a:pPr algn="ctr"/>
+            <a:r>
+              <a:rPr lang="es-ES" dirty="0" smtClean="0">
+                <a:solidFill>
+                  <a:schemeClr val="tx1"/>
+                </a:solidFill>
+                <a:latin typeface="Arial" panose="020B0604020202020204" pitchFamily="34" charset="0"/>
+                <a:cs typeface="Arial" panose="020B0604020202020204" pitchFamily="34" charset="0"/>
+              </a:rPr>
+              <a:t>1/8</a:t>
+            </a:r>
+            <a:endParaRPr lang="en-US" dirty="0">
+              <a:solidFill>
+                <a:schemeClr val="tx1"/>
+              </a:solidFill>
+              <a:latin typeface="Arial" panose="020B0604020202020204" pitchFamily="34" charset="0"/>
+              <a:cs typeface="Arial" panose="020B0604020202020204" pitchFamily="34" charset="0"/>
+            </a:endParaRPr>
+          </a:p>
+        </p:txBody>
+      </p:sp>
+      <p:sp>
+        <p:nvSpPr>
+          <p:cNvPr id="45" name="Elipse 44"/>
+          <p:cNvSpPr/>
+          <p:nvPr/>
+        </p:nvSpPr>
+        <p:spPr>
+          <a:xfrm>
+            <a:off x="6260558" y="4611864"/>
+            <a:ext cx="758668" cy="500406"/>
+          </a:xfrm>
+          <a:prstGeom prst="ellipse">
+            <a:avLst/>
+          </a:prstGeom>
+          <a:solidFill>
+            <a:srgbClr val="D5E8D4"/>
+          </a:solidFill>
+          <a:ln>
+            <a:solidFill>
+              <a:srgbClr val="96BF80"/>
+            </a:solidFill>
+          </a:ln>
+        </p:spPr>
+        <p:style>
+          <a:lnRef idx="2">
+            <a:schemeClr val="accent1">
+              <a:shade val="50000"/>
+            </a:schemeClr>
+          </a:lnRef>
+          <a:fillRef idx="1">
+            <a:schemeClr val="accent1"/>
+          </a:fillRef>
+          <a:effectRef idx="0">
+            <a:schemeClr val="accent1"/>
+          </a:effectRef>
+          <a:fontRef idx="minor">
+            <a:schemeClr val="lt1"/>
+          </a:fontRef>
+        </p:style>
+        <p:txBody>
+          <a:bodyPr rtlCol="0" anchor="ctr"/>
+          <a:lstStyle/>
+          <a:p>
+            <a:pPr algn="ctr"/>
+            <a:r>
+              <a:rPr lang="es-ES" dirty="0" smtClean="0">
+                <a:solidFill>
+                  <a:schemeClr val="tx1"/>
+                </a:solidFill>
+                <a:latin typeface="Arial" panose="020B0604020202020204" pitchFamily="34" charset="0"/>
+                <a:cs typeface="Arial" panose="020B0604020202020204" pitchFamily="34" charset="0"/>
+              </a:rPr>
+              <a:t>1/8</a:t>
+            </a:r>
+            <a:endParaRPr lang="en-US" dirty="0">
+              <a:solidFill>
+                <a:schemeClr val="tx1"/>
+              </a:solidFill>
+              <a:latin typeface="Arial" panose="020B0604020202020204" pitchFamily="34" charset="0"/>
+              <a:cs typeface="Arial" panose="020B0604020202020204" pitchFamily="34" charset="0"/>
+            </a:endParaRPr>
+          </a:p>
+        </p:txBody>
+      </p:sp>
+      <p:sp>
+        <p:nvSpPr>
+          <p:cNvPr id="48" name="Elipse 47"/>
+          <p:cNvSpPr/>
+          <p:nvPr/>
+        </p:nvSpPr>
+        <p:spPr>
+          <a:xfrm>
+            <a:off x="4301227" y="4611864"/>
+            <a:ext cx="758668" cy="500406"/>
+          </a:xfrm>
+          <a:prstGeom prst="ellipse">
+            <a:avLst/>
+          </a:prstGeom>
+          <a:solidFill>
+            <a:srgbClr val="D5E8D4"/>
+          </a:solidFill>
+          <a:ln>
+            <a:solidFill>
+              <a:srgbClr val="96BF80"/>
+            </a:solidFill>
+          </a:ln>
+        </p:spPr>
+        <p:style>
+          <a:lnRef idx="2">
+            <a:schemeClr val="accent1">
+              <a:shade val="50000"/>
+            </a:schemeClr>
+          </a:lnRef>
+          <a:fillRef idx="1">
+            <a:schemeClr val="accent1"/>
+          </a:fillRef>
+          <a:effectRef idx="0">
+            <a:schemeClr val="accent1"/>
+          </a:effectRef>
+          <a:fontRef idx="minor">
+            <a:schemeClr val="lt1"/>
+          </a:fontRef>
+        </p:style>
+        <p:txBody>
+          <a:bodyPr rtlCol="0" anchor="ctr"/>
+          <a:lstStyle/>
+          <a:p>
+            <a:pPr algn="ctr"/>
+            <a:r>
+              <a:rPr lang="es-ES" dirty="0" smtClean="0">
+                <a:solidFill>
+                  <a:schemeClr val="tx1"/>
+                </a:solidFill>
+                <a:latin typeface="Arial" panose="020B0604020202020204" pitchFamily="34" charset="0"/>
+                <a:cs typeface="Arial" panose="020B0604020202020204" pitchFamily="34" charset="0"/>
+              </a:rPr>
+              <a:t>1/8</a:t>
+            </a:r>
+            <a:endParaRPr lang="en-US" dirty="0">
+              <a:solidFill>
+                <a:schemeClr val="tx1"/>
+              </a:solidFill>
+              <a:latin typeface="Arial" panose="020B0604020202020204" pitchFamily="34" charset="0"/>
+              <a:cs typeface="Arial" panose="020B0604020202020204" pitchFamily="34" charset="0"/>
+            </a:endParaRPr>
+          </a:p>
+        </p:txBody>
+      </p:sp>
+      <p:sp>
+        <p:nvSpPr>
+          <p:cNvPr id="49" name="Elipse 48"/>
+          <p:cNvSpPr/>
+          <p:nvPr/>
+        </p:nvSpPr>
+        <p:spPr>
+          <a:xfrm>
+            <a:off x="5173529" y="4619777"/>
+            <a:ext cx="758668" cy="500406"/>
+          </a:xfrm>
+          <a:prstGeom prst="ellipse">
+            <a:avLst/>
+          </a:prstGeom>
+          <a:solidFill>
+            <a:srgbClr val="D5E8D4"/>
+          </a:solidFill>
+          <a:ln>
+            <a:solidFill>
+              <a:srgbClr val="96BF80"/>
+            </a:solidFill>
+          </a:ln>
+        </p:spPr>
+        <p:style>
+          <a:lnRef idx="2">
+            <a:schemeClr val="accent1">
+              <a:shade val="50000"/>
+            </a:schemeClr>
+          </a:lnRef>
+          <a:fillRef idx="1">
+            <a:schemeClr val="accent1"/>
+          </a:fillRef>
+          <a:effectRef idx="0">
+            <a:schemeClr val="accent1"/>
+          </a:effectRef>
+          <a:fontRef idx="minor">
+            <a:schemeClr val="lt1"/>
+          </a:fontRef>
+        </p:style>
+        <p:txBody>
+          <a:bodyPr rtlCol="0" anchor="ctr"/>
+          <a:lstStyle/>
+          <a:p>
+            <a:pPr algn="ctr"/>
+            <a:r>
+              <a:rPr lang="es-ES" dirty="0" smtClean="0">
+                <a:solidFill>
+                  <a:schemeClr val="tx1"/>
+                </a:solidFill>
+                <a:latin typeface="Arial" panose="020B0604020202020204" pitchFamily="34" charset="0"/>
+                <a:cs typeface="Arial" panose="020B0604020202020204" pitchFamily="34" charset="0"/>
+              </a:rPr>
+              <a:t>1/8</a:t>
+            </a:r>
+            <a:endParaRPr lang="en-US" dirty="0">
+              <a:solidFill>
+                <a:schemeClr val="tx1"/>
+              </a:solidFill>
+              <a:latin typeface="Arial" panose="020B0604020202020204" pitchFamily="34" charset="0"/>
+              <a:cs typeface="Arial" panose="020B0604020202020204" pitchFamily="34" charset="0"/>
+            </a:endParaRPr>
+          </a:p>
+        </p:txBody>
+      </p:sp>
+      <p:sp>
+        <p:nvSpPr>
+          <p:cNvPr id="50" name="Elipse 49"/>
+          <p:cNvSpPr/>
+          <p:nvPr/>
+        </p:nvSpPr>
+        <p:spPr>
+          <a:xfrm>
+            <a:off x="3193586" y="4617945"/>
+            <a:ext cx="758668" cy="500406"/>
+          </a:xfrm>
+          <a:prstGeom prst="ellipse">
+            <a:avLst/>
+          </a:prstGeom>
+          <a:solidFill>
+            <a:srgbClr val="D5E8D4"/>
+          </a:solidFill>
+          <a:ln>
+            <a:solidFill>
+              <a:srgbClr val="96BF80"/>
+            </a:solidFill>
+          </a:ln>
+        </p:spPr>
+        <p:style>
+          <a:lnRef idx="2">
+            <a:schemeClr val="accent1">
+              <a:shade val="50000"/>
+            </a:schemeClr>
+          </a:lnRef>
+          <a:fillRef idx="1">
+            <a:schemeClr val="accent1"/>
+          </a:fillRef>
+          <a:effectRef idx="0">
+            <a:schemeClr val="accent1"/>
+          </a:effectRef>
+          <a:fontRef idx="minor">
+            <a:schemeClr val="lt1"/>
+          </a:fontRef>
+        </p:style>
+        <p:txBody>
+          <a:bodyPr rtlCol="0" anchor="ctr"/>
+          <a:lstStyle/>
+          <a:p>
+            <a:pPr algn="ctr"/>
+            <a:r>
+              <a:rPr lang="es-ES" dirty="0" smtClean="0">
+                <a:solidFill>
+                  <a:schemeClr val="tx1"/>
+                </a:solidFill>
+                <a:latin typeface="Arial" panose="020B0604020202020204" pitchFamily="34" charset="0"/>
+                <a:cs typeface="Arial" panose="020B0604020202020204" pitchFamily="34" charset="0"/>
+              </a:rPr>
+              <a:t>1/8</a:t>
+            </a:r>
+            <a:endParaRPr lang="en-US" dirty="0">
+              <a:solidFill>
+                <a:schemeClr val="tx1"/>
+              </a:solidFill>
+              <a:latin typeface="Arial" panose="020B0604020202020204" pitchFamily="34" charset="0"/>
+              <a:cs typeface="Arial" panose="020B0604020202020204" pitchFamily="34" charset="0"/>
+            </a:endParaRPr>
+          </a:p>
+        </p:txBody>
+      </p:sp>
+      <p:sp>
+        <p:nvSpPr>
+          <p:cNvPr id="51" name="Elipse 50"/>
+          <p:cNvSpPr/>
+          <p:nvPr/>
+        </p:nvSpPr>
+        <p:spPr>
+          <a:xfrm>
+            <a:off x="2298795" y="4617945"/>
+            <a:ext cx="758668" cy="500406"/>
+          </a:xfrm>
+          <a:prstGeom prst="ellipse">
+            <a:avLst/>
+          </a:prstGeom>
+          <a:solidFill>
+            <a:srgbClr val="D5E8D4"/>
+          </a:solidFill>
+          <a:ln>
+            <a:solidFill>
+              <a:srgbClr val="96BF80"/>
+            </a:solidFill>
+          </a:ln>
+        </p:spPr>
+        <p:style>
+          <a:lnRef idx="2">
+            <a:schemeClr val="accent1">
+              <a:shade val="50000"/>
+            </a:schemeClr>
+          </a:lnRef>
+          <a:fillRef idx="1">
+            <a:schemeClr val="accent1"/>
+          </a:fillRef>
+          <a:effectRef idx="0">
+            <a:schemeClr val="accent1"/>
+          </a:effectRef>
+          <a:fontRef idx="minor">
+            <a:schemeClr val="lt1"/>
+          </a:fontRef>
+        </p:style>
+        <p:txBody>
+          <a:bodyPr rtlCol="0" anchor="ctr"/>
+          <a:lstStyle/>
+          <a:p>
+            <a:pPr algn="ctr"/>
+            <a:r>
+              <a:rPr lang="es-ES" dirty="0" smtClean="0">
+                <a:solidFill>
+                  <a:schemeClr val="tx1"/>
+                </a:solidFill>
+                <a:latin typeface="Arial" panose="020B0604020202020204" pitchFamily="34" charset="0"/>
+                <a:cs typeface="Arial" panose="020B0604020202020204" pitchFamily="34" charset="0"/>
+              </a:rPr>
+              <a:t>1/8</a:t>
+            </a:r>
+            <a:endParaRPr lang="en-US" dirty="0">
+              <a:solidFill>
+                <a:schemeClr val="tx1"/>
+              </a:solidFill>
+              <a:latin typeface="Arial" panose="020B0604020202020204" pitchFamily="34" charset="0"/>
+              <a:cs typeface="Arial" panose="020B0604020202020204" pitchFamily="34" charset="0"/>
+            </a:endParaRPr>
+          </a:p>
+        </p:txBody>
+      </p:sp>
+      <p:sp>
+        <p:nvSpPr>
+          <p:cNvPr id="52" name="CuadroTexto 51"/>
+          <p:cNvSpPr txBox="1"/>
+          <p:nvPr/>
+        </p:nvSpPr>
+        <p:spPr>
+          <a:xfrm>
+            <a:off x="2522090" y="5096662"/>
+            <a:ext cx="454631" cy="369332"/>
+          </a:xfrm>
+          <a:prstGeom prst="rect">
+            <a:avLst/>
+          </a:prstGeom>
+          <a:noFill/>
+        </p:spPr>
+        <p:txBody>
+          <a:bodyPr wrap="square" rtlCol="0">
+            <a:spAutoFit/>
+          </a:bodyPr>
+          <a:lstStyle/>
+          <a:p>
+            <a:r>
+              <a:rPr lang="es-ES" dirty="0" smtClean="0">
+                <a:latin typeface="Arial" panose="020B0604020202020204" pitchFamily="34" charset="0"/>
+                <a:cs typeface="Arial" panose="020B0604020202020204" pitchFamily="34" charset="0"/>
+              </a:rPr>
+              <a:t>E</a:t>
+            </a:r>
+            <a:endParaRPr lang="en-US" dirty="0">
+              <a:latin typeface="Arial" panose="020B0604020202020204" pitchFamily="34" charset="0"/>
+              <a:cs typeface="Arial" panose="020B0604020202020204" pitchFamily="34" charset="0"/>
+            </a:endParaRPr>
+          </a:p>
+        </p:txBody>
+      </p:sp>
+      <p:sp>
+        <p:nvSpPr>
+          <p:cNvPr id="53" name="CuadroTexto 52"/>
+          <p:cNvSpPr txBox="1"/>
+          <p:nvPr/>
+        </p:nvSpPr>
+        <p:spPr>
+          <a:xfrm>
+            <a:off x="3427734" y="5096662"/>
+            <a:ext cx="454631" cy="369332"/>
+          </a:xfrm>
+          <a:prstGeom prst="rect">
+            <a:avLst/>
+          </a:prstGeom>
+          <a:noFill/>
+        </p:spPr>
+        <p:txBody>
+          <a:bodyPr wrap="square" rtlCol="0">
+            <a:spAutoFit/>
+          </a:bodyPr>
+          <a:lstStyle/>
+          <a:p>
+            <a:r>
+              <a:rPr lang="es-ES" dirty="0">
+                <a:latin typeface="Arial" panose="020B0604020202020204" pitchFamily="34" charset="0"/>
+                <a:cs typeface="Arial" panose="020B0604020202020204" pitchFamily="34" charset="0"/>
+              </a:rPr>
+              <a:t>N</a:t>
+            </a:r>
+            <a:endParaRPr lang="en-US" dirty="0">
+              <a:latin typeface="Arial" panose="020B0604020202020204" pitchFamily="34" charset="0"/>
+              <a:cs typeface="Arial" panose="020B0604020202020204" pitchFamily="34" charset="0"/>
+            </a:endParaRPr>
+          </a:p>
+        </p:txBody>
+      </p:sp>
+      <p:sp>
+        <p:nvSpPr>
+          <p:cNvPr id="54" name="CuadroTexto 53"/>
+          <p:cNvSpPr txBox="1"/>
+          <p:nvPr/>
+        </p:nvSpPr>
+        <p:spPr>
+          <a:xfrm>
+            <a:off x="5418151" y="5096963"/>
+            <a:ext cx="454631" cy="369332"/>
+          </a:xfrm>
+          <a:prstGeom prst="rect">
+            <a:avLst/>
+          </a:prstGeom>
+          <a:noFill/>
+        </p:spPr>
+        <p:txBody>
+          <a:bodyPr wrap="square" rtlCol="0">
+            <a:spAutoFit/>
+          </a:bodyPr>
+          <a:lstStyle/>
+          <a:p>
+            <a:r>
+              <a:rPr lang="es-ES" dirty="0">
+                <a:latin typeface="Arial" panose="020B0604020202020204" pitchFamily="34" charset="0"/>
+                <a:cs typeface="Arial" panose="020B0604020202020204" pitchFamily="34" charset="0"/>
+              </a:rPr>
+              <a:t>A</a:t>
+            </a:r>
+            <a:endParaRPr lang="en-US" dirty="0">
+              <a:latin typeface="Arial" panose="020B0604020202020204" pitchFamily="34" charset="0"/>
+              <a:cs typeface="Arial" panose="020B0604020202020204" pitchFamily="34" charset="0"/>
+            </a:endParaRPr>
+          </a:p>
+        </p:txBody>
+      </p:sp>
+      <p:sp>
+        <p:nvSpPr>
+          <p:cNvPr id="57" name="CuadroTexto 56"/>
+          <p:cNvSpPr txBox="1"/>
+          <p:nvPr/>
+        </p:nvSpPr>
+        <p:spPr>
+          <a:xfrm>
+            <a:off x="4481596" y="5107783"/>
+            <a:ext cx="454631" cy="369332"/>
+          </a:xfrm>
+          <a:prstGeom prst="rect">
+            <a:avLst/>
+          </a:prstGeom>
+          <a:noFill/>
+        </p:spPr>
+        <p:txBody>
+          <a:bodyPr wrap="square" rtlCol="0">
+            <a:spAutoFit/>
+          </a:bodyPr>
+          <a:lstStyle/>
+          <a:p>
+            <a:r>
+              <a:rPr lang="es-ES" dirty="0">
+                <a:latin typeface="Arial" panose="020B0604020202020204" pitchFamily="34" charset="0"/>
+                <a:cs typeface="Arial" panose="020B0604020202020204" pitchFamily="34" charset="0"/>
+              </a:rPr>
+              <a:t>T</a:t>
+            </a:r>
+            <a:endParaRPr lang="en-US" dirty="0">
+              <a:latin typeface="Arial" panose="020B0604020202020204" pitchFamily="34" charset="0"/>
+              <a:cs typeface="Arial" panose="020B0604020202020204" pitchFamily="34" charset="0"/>
+            </a:endParaRPr>
+          </a:p>
+        </p:txBody>
+      </p:sp>
+      <p:sp>
+        <p:nvSpPr>
+          <p:cNvPr id="58" name="CuadroTexto 57"/>
+          <p:cNvSpPr txBox="1"/>
+          <p:nvPr/>
+        </p:nvSpPr>
+        <p:spPr>
+          <a:xfrm>
+            <a:off x="7329394" y="5096963"/>
+            <a:ext cx="454631" cy="369332"/>
+          </a:xfrm>
+          <a:prstGeom prst="rect">
+            <a:avLst/>
+          </a:prstGeom>
+          <a:noFill/>
+        </p:spPr>
+        <p:txBody>
+          <a:bodyPr wrap="square" rtlCol="0">
+            <a:spAutoFit/>
+          </a:bodyPr>
+          <a:lstStyle/>
+          <a:p>
+            <a:r>
+              <a:rPr lang="es-ES" dirty="0" smtClean="0">
+                <a:latin typeface="Arial" panose="020B0604020202020204" pitchFamily="34" charset="0"/>
+                <a:cs typeface="Arial" panose="020B0604020202020204" pitchFamily="34" charset="0"/>
+              </a:rPr>
+              <a:t>O</a:t>
+            </a:r>
+            <a:endParaRPr lang="en-US" dirty="0">
+              <a:latin typeface="Arial" panose="020B0604020202020204" pitchFamily="34" charset="0"/>
+              <a:cs typeface="Arial" panose="020B0604020202020204" pitchFamily="34" charset="0"/>
+            </a:endParaRPr>
+          </a:p>
+        </p:txBody>
+      </p:sp>
+      <p:sp>
+        <p:nvSpPr>
+          <p:cNvPr id="59" name="CuadroTexto 58"/>
+          <p:cNvSpPr txBox="1"/>
+          <p:nvPr/>
+        </p:nvSpPr>
+        <p:spPr>
+          <a:xfrm>
+            <a:off x="6464961" y="5096963"/>
+            <a:ext cx="356412" cy="369332"/>
+          </a:xfrm>
+          <a:prstGeom prst="rect">
+            <a:avLst/>
+          </a:prstGeom>
+          <a:noFill/>
+        </p:spPr>
+        <p:txBody>
+          <a:bodyPr wrap="square" rtlCol="0">
+            <a:spAutoFit/>
+          </a:bodyPr>
+          <a:lstStyle/>
+          <a:p>
+            <a:r>
+              <a:rPr lang="es-ES" dirty="0" smtClean="0">
+                <a:latin typeface="Arial" panose="020B0604020202020204" pitchFamily="34" charset="0"/>
+                <a:cs typeface="Arial" panose="020B0604020202020204" pitchFamily="34" charset="0"/>
+              </a:rPr>
+              <a:t>Z</a:t>
+            </a:r>
+            <a:endParaRPr lang="en-US" dirty="0">
+              <a:latin typeface="Arial" panose="020B0604020202020204" pitchFamily="34" charset="0"/>
+              <a:cs typeface="Arial" panose="020B0604020202020204" pitchFamily="34" charset="0"/>
+            </a:endParaRPr>
+          </a:p>
+        </p:txBody>
+      </p:sp>
+      <p:sp>
+        <p:nvSpPr>
+          <p:cNvPr id="60" name="CuadroTexto 59"/>
+          <p:cNvSpPr txBox="1"/>
+          <p:nvPr/>
+        </p:nvSpPr>
+        <p:spPr>
+          <a:xfrm>
+            <a:off x="8471383" y="5087914"/>
+            <a:ext cx="454631" cy="369332"/>
+          </a:xfrm>
+          <a:prstGeom prst="rect">
+            <a:avLst/>
+          </a:prstGeom>
+          <a:noFill/>
+        </p:spPr>
+        <p:txBody>
+          <a:bodyPr wrap="square" rtlCol="0">
+            <a:spAutoFit/>
+          </a:bodyPr>
+          <a:lstStyle/>
+          <a:p>
+            <a:r>
+              <a:rPr lang="es-ES" dirty="0" smtClean="0">
+                <a:latin typeface="Arial" panose="020B0604020202020204" pitchFamily="34" charset="0"/>
+                <a:cs typeface="Arial" panose="020B0604020202020204" pitchFamily="34" charset="0"/>
+              </a:rPr>
+              <a:t>R</a:t>
+            </a:r>
+            <a:endParaRPr lang="en-US" dirty="0">
+              <a:latin typeface="Arial" panose="020B0604020202020204" pitchFamily="34" charset="0"/>
+              <a:cs typeface="Arial" panose="020B0604020202020204" pitchFamily="34" charset="0"/>
+            </a:endParaRPr>
+          </a:p>
+        </p:txBody>
+      </p:sp>
+      <p:sp>
+        <p:nvSpPr>
+          <p:cNvPr id="61" name="CuadroTexto 60"/>
+          <p:cNvSpPr txBox="1"/>
+          <p:nvPr/>
+        </p:nvSpPr>
+        <p:spPr>
+          <a:xfrm>
+            <a:off x="9994031" y="6238362"/>
+            <a:ext cx="454631" cy="369332"/>
+          </a:xfrm>
+          <a:prstGeom prst="rect">
+            <a:avLst/>
+          </a:prstGeom>
+          <a:noFill/>
+        </p:spPr>
+        <p:txBody>
+          <a:bodyPr wrap="square" rtlCol="0">
+            <a:spAutoFit/>
+          </a:bodyPr>
+          <a:lstStyle/>
+          <a:p>
+            <a:r>
+              <a:rPr lang="es-ES" dirty="0" smtClean="0">
+                <a:latin typeface="Arial" panose="020B0604020202020204" pitchFamily="34" charset="0"/>
+                <a:cs typeface="Arial" panose="020B0604020202020204" pitchFamily="34" charset="0"/>
+              </a:rPr>
+              <a:t>I</a:t>
+            </a:r>
+            <a:endParaRPr lang="en-US" dirty="0">
+              <a:latin typeface="Arial" panose="020B0604020202020204" pitchFamily="34" charset="0"/>
+              <a:cs typeface="Arial" panose="020B0604020202020204" pitchFamily="34" charset="0"/>
+            </a:endParaRPr>
+          </a:p>
+        </p:txBody>
+      </p:sp>
+      <p:sp>
+        <p:nvSpPr>
+          <p:cNvPr id="62" name="Elipse 61"/>
+          <p:cNvSpPr/>
+          <p:nvPr/>
+        </p:nvSpPr>
+        <p:spPr>
+          <a:xfrm>
+            <a:off x="8552557" y="5716498"/>
+            <a:ext cx="898614" cy="521865"/>
+          </a:xfrm>
+          <a:prstGeom prst="ellipse">
+            <a:avLst/>
+          </a:prstGeom>
+          <a:solidFill>
+            <a:srgbClr val="D5E8D4"/>
+          </a:solidFill>
+          <a:ln>
+            <a:solidFill>
+              <a:srgbClr val="96BF80"/>
+            </a:solidFill>
+          </a:ln>
+        </p:spPr>
+        <p:style>
+          <a:lnRef idx="2">
+            <a:schemeClr val="accent1">
+              <a:shade val="50000"/>
+            </a:schemeClr>
+          </a:lnRef>
+          <a:fillRef idx="1">
+            <a:schemeClr val="accent1"/>
+          </a:fillRef>
+          <a:effectRef idx="0">
+            <a:schemeClr val="accent1"/>
+          </a:effectRef>
+          <a:fontRef idx="minor">
+            <a:schemeClr val="lt1"/>
+          </a:fontRef>
+        </p:style>
+        <p:txBody>
+          <a:bodyPr rtlCol="0" anchor="ctr"/>
+          <a:lstStyle/>
+          <a:p>
+            <a:pPr algn="ctr"/>
+            <a:r>
+              <a:rPr lang="es-ES" dirty="0" smtClean="0">
+                <a:solidFill>
+                  <a:schemeClr val="tx1"/>
+                </a:solidFill>
+                <a:latin typeface="Arial" panose="020B0604020202020204" pitchFamily="34" charset="0"/>
+                <a:cs typeface="Arial" panose="020B0604020202020204" pitchFamily="34" charset="0"/>
+              </a:rPr>
+              <a:t>1/16</a:t>
+            </a:r>
+            <a:endParaRPr lang="en-US" dirty="0">
+              <a:solidFill>
+                <a:schemeClr val="tx1"/>
+              </a:solidFill>
+              <a:latin typeface="Arial" panose="020B0604020202020204" pitchFamily="34" charset="0"/>
+              <a:cs typeface="Arial" panose="020B0604020202020204" pitchFamily="34" charset="0"/>
+            </a:endParaRPr>
+          </a:p>
+        </p:txBody>
+      </p:sp>
+      <p:sp>
+        <p:nvSpPr>
+          <p:cNvPr id="63" name="Elipse 62"/>
+          <p:cNvSpPr/>
+          <p:nvPr/>
+        </p:nvSpPr>
+        <p:spPr>
+          <a:xfrm>
+            <a:off x="9550048" y="5716497"/>
+            <a:ext cx="898614" cy="521865"/>
+          </a:xfrm>
+          <a:prstGeom prst="ellipse">
+            <a:avLst/>
+          </a:prstGeom>
+          <a:solidFill>
+            <a:srgbClr val="D5E8D4"/>
+          </a:solidFill>
+          <a:ln>
+            <a:solidFill>
+              <a:srgbClr val="96BF80"/>
+            </a:solidFill>
+          </a:ln>
+        </p:spPr>
+        <p:style>
+          <a:lnRef idx="2">
+            <a:schemeClr val="accent1">
+              <a:shade val="50000"/>
+            </a:schemeClr>
+          </a:lnRef>
+          <a:fillRef idx="1">
+            <a:schemeClr val="accent1"/>
+          </a:fillRef>
+          <a:effectRef idx="0">
+            <a:schemeClr val="accent1"/>
+          </a:effectRef>
+          <a:fontRef idx="minor">
+            <a:schemeClr val="lt1"/>
+          </a:fontRef>
+        </p:style>
+        <p:txBody>
+          <a:bodyPr rtlCol="0" anchor="ctr"/>
+          <a:lstStyle/>
+          <a:p>
+            <a:pPr algn="ctr"/>
+            <a:r>
+              <a:rPr lang="es-ES" dirty="0" smtClean="0">
+                <a:solidFill>
+                  <a:schemeClr val="tx1"/>
+                </a:solidFill>
+                <a:latin typeface="Arial" panose="020B0604020202020204" pitchFamily="34" charset="0"/>
+                <a:cs typeface="Arial" panose="020B0604020202020204" pitchFamily="34" charset="0"/>
+              </a:rPr>
+              <a:t>1/16</a:t>
+            </a:r>
+            <a:endParaRPr lang="en-US" dirty="0">
+              <a:solidFill>
+                <a:schemeClr val="tx1"/>
+              </a:solidFill>
+              <a:latin typeface="Arial" panose="020B0604020202020204" pitchFamily="34" charset="0"/>
+              <a:cs typeface="Arial" panose="020B0604020202020204" pitchFamily="34" charset="0"/>
+            </a:endParaRPr>
+          </a:p>
+        </p:txBody>
+      </p:sp>
+      <p:sp>
+        <p:nvSpPr>
+          <p:cNvPr id="64" name="CuadroTexto 63"/>
+          <p:cNvSpPr txBox="1"/>
+          <p:nvPr/>
+        </p:nvSpPr>
+        <p:spPr>
+          <a:xfrm>
+            <a:off x="8864876" y="6238362"/>
+            <a:ext cx="454631" cy="369332"/>
+          </a:xfrm>
+          <a:prstGeom prst="rect">
+            <a:avLst/>
+          </a:prstGeom>
+          <a:noFill/>
+        </p:spPr>
+        <p:txBody>
+          <a:bodyPr wrap="square" rtlCol="0">
+            <a:spAutoFit/>
+          </a:bodyPr>
+          <a:lstStyle/>
+          <a:p>
+            <a:r>
+              <a:rPr lang="es-ES" dirty="0">
+                <a:latin typeface="Arial" panose="020B0604020202020204" pitchFamily="34" charset="0"/>
+                <a:cs typeface="Arial" panose="020B0604020202020204" pitchFamily="34" charset="0"/>
+              </a:rPr>
+              <a:t>C</a:t>
+            </a:r>
+            <a:endParaRPr lang="en-US" dirty="0">
+              <a:latin typeface="Arial" panose="020B0604020202020204" pitchFamily="34" charset="0"/>
+              <a:cs typeface="Arial" panose="020B0604020202020204" pitchFamily="34" charset="0"/>
+            </a:endParaRPr>
+          </a:p>
+        </p:txBody>
+      </p:sp>
+      <p:cxnSp>
+        <p:nvCxnSpPr>
+          <p:cNvPr id="65" name="Conector recto 64"/>
+          <p:cNvCxnSpPr>
+            <a:stCxn id="39" idx="0"/>
+            <a:endCxn id="33" idx="4"/>
+          </p:cNvCxnSpPr>
+          <p:nvPr/>
+        </p:nvCxnSpPr>
+        <p:spPr>
+          <a:xfrm flipH="1" flipV="1">
+            <a:off x="7986828" y="2206164"/>
+            <a:ext cx="894134" cy="914741"/>
+          </a:xfrm>
+          <a:prstGeom prst="line">
+            <a:avLst/>
+          </a:prstGeom>
+          <a:ln>
+            <a:solidFill>
+              <a:schemeClr val="tx1"/>
+            </a:solidFill>
+          </a:ln>
+        </p:spPr>
+        <p:style>
+          <a:lnRef idx="1">
+            <a:schemeClr val="accent1"/>
+          </a:lnRef>
+          <a:fillRef idx="0">
+            <a:schemeClr val="accent1"/>
+          </a:fillRef>
+          <a:effectRef idx="0">
+            <a:schemeClr val="accent1"/>
+          </a:effectRef>
+          <a:fontRef idx="minor">
+            <a:schemeClr val="tx1"/>
+          </a:fontRef>
+        </p:style>
+      </p:cxnSp>
+      <p:cxnSp>
+        <p:nvCxnSpPr>
+          <p:cNvPr id="66" name="Conector recto 65"/>
+          <p:cNvCxnSpPr>
+            <a:stCxn id="34" idx="4"/>
+            <a:endCxn id="51" idx="0"/>
+          </p:cNvCxnSpPr>
+          <p:nvPr/>
+        </p:nvCxnSpPr>
+        <p:spPr>
+          <a:xfrm flipH="1">
+            <a:off x="2678129" y="3621311"/>
+            <a:ext cx="515457" cy="996634"/>
+          </a:xfrm>
+          <a:prstGeom prst="line">
+            <a:avLst/>
+          </a:prstGeom>
+          <a:ln>
+            <a:solidFill>
+              <a:schemeClr val="tx1"/>
+            </a:solidFill>
+          </a:ln>
+        </p:spPr>
+        <p:style>
+          <a:lnRef idx="1">
+            <a:schemeClr val="accent1"/>
+          </a:lnRef>
+          <a:fillRef idx="0">
+            <a:schemeClr val="accent1"/>
+          </a:fillRef>
+          <a:effectRef idx="0">
+            <a:schemeClr val="accent1"/>
+          </a:effectRef>
+          <a:fontRef idx="minor">
+            <a:schemeClr val="tx1"/>
+          </a:fontRef>
+        </p:style>
+      </p:cxnSp>
+      <p:cxnSp>
+        <p:nvCxnSpPr>
+          <p:cNvPr id="67" name="Conector recto 66"/>
+          <p:cNvCxnSpPr>
+            <a:stCxn id="34" idx="4"/>
+            <a:endCxn id="50" idx="0"/>
+          </p:cNvCxnSpPr>
+          <p:nvPr/>
+        </p:nvCxnSpPr>
+        <p:spPr>
+          <a:xfrm>
+            <a:off x="3193586" y="3621311"/>
+            <a:ext cx="379334" cy="996634"/>
+          </a:xfrm>
+          <a:prstGeom prst="line">
+            <a:avLst/>
+          </a:prstGeom>
+          <a:ln>
+            <a:solidFill>
+              <a:schemeClr val="tx1"/>
+            </a:solidFill>
+          </a:ln>
+        </p:spPr>
+        <p:style>
+          <a:lnRef idx="1">
+            <a:schemeClr val="accent1"/>
+          </a:lnRef>
+          <a:fillRef idx="0">
+            <a:schemeClr val="accent1"/>
+          </a:fillRef>
+          <a:effectRef idx="0">
+            <a:schemeClr val="accent1"/>
+          </a:effectRef>
+          <a:fontRef idx="minor">
+            <a:schemeClr val="tx1"/>
+          </a:fontRef>
+        </p:style>
+      </p:cxnSp>
+      <p:cxnSp>
+        <p:nvCxnSpPr>
+          <p:cNvPr id="68" name="Conector recto 67"/>
+          <p:cNvCxnSpPr>
+            <a:stCxn id="48" idx="0"/>
+            <a:endCxn id="35" idx="4"/>
+          </p:cNvCxnSpPr>
+          <p:nvPr/>
+        </p:nvCxnSpPr>
+        <p:spPr>
+          <a:xfrm flipV="1">
+            <a:off x="4680561" y="3606976"/>
+            <a:ext cx="351593" cy="1004888"/>
+          </a:xfrm>
+          <a:prstGeom prst="line">
+            <a:avLst/>
+          </a:prstGeom>
+          <a:ln>
+            <a:solidFill>
+              <a:schemeClr val="tx1"/>
+            </a:solidFill>
+          </a:ln>
+        </p:spPr>
+        <p:style>
+          <a:lnRef idx="1">
+            <a:schemeClr val="accent1"/>
+          </a:lnRef>
+          <a:fillRef idx="0">
+            <a:schemeClr val="accent1"/>
+          </a:fillRef>
+          <a:effectRef idx="0">
+            <a:schemeClr val="accent1"/>
+          </a:effectRef>
+          <a:fontRef idx="minor">
+            <a:schemeClr val="tx1"/>
+          </a:fontRef>
+        </p:style>
+      </p:cxnSp>
+      <p:cxnSp>
+        <p:nvCxnSpPr>
+          <p:cNvPr id="69" name="Conector recto 68"/>
+          <p:cNvCxnSpPr>
+            <a:stCxn id="49" idx="0"/>
+            <a:endCxn id="35" idx="4"/>
+          </p:cNvCxnSpPr>
+          <p:nvPr/>
+        </p:nvCxnSpPr>
+        <p:spPr>
+          <a:xfrm flipH="1" flipV="1">
+            <a:off x="5032154" y="3606976"/>
+            <a:ext cx="520709" cy="1012801"/>
+          </a:xfrm>
+          <a:prstGeom prst="line">
+            <a:avLst/>
+          </a:prstGeom>
+          <a:ln>
+            <a:solidFill>
+              <a:schemeClr val="tx1"/>
+            </a:solidFill>
+          </a:ln>
+        </p:spPr>
+        <p:style>
+          <a:lnRef idx="1">
+            <a:schemeClr val="accent1"/>
+          </a:lnRef>
+          <a:fillRef idx="0">
+            <a:schemeClr val="accent1"/>
+          </a:fillRef>
+          <a:effectRef idx="0">
+            <a:schemeClr val="accent1"/>
+          </a:effectRef>
+          <a:fontRef idx="minor">
+            <a:schemeClr val="tx1"/>
+          </a:fontRef>
+        </p:style>
+      </p:cxnSp>
+      <p:cxnSp>
+        <p:nvCxnSpPr>
+          <p:cNvPr id="72" name="Conector recto 71"/>
+          <p:cNvCxnSpPr>
+            <a:stCxn id="45" idx="0"/>
+            <a:endCxn id="36" idx="4"/>
+          </p:cNvCxnSpPr>
+          <p:nvPr/>
+        </p:nvCxnSpPr>
+        <p:spPr>
+          <a:xfrm flipV="1">
+            <a:off x="6639892" y="3625994"/>
+            <a:ext cx="421746" cy="985870"/>
+          </a:xfrm>
+          <a:prstGeom prst="line">
+            <a:avLst/>
+          </a:prstGeom>
+          <a:ln>
+            <a:solidFill>
+              <a:schemeClr val="tx1"/>
+            </a:solidFill>
+          </a:ln>
+        </p:spPr>
+        <p:style>
+          <a:lnRef idx="1">
+            <a:schemeClr val="accent1"/>
+          </a:lnRef>
+          <a:fillRef idx="0">
+            <a:schemeClr val="accent1"/>
+          </a:fillRef>
+          <a:effectRef idx="0">
+            <a:schemeClr val="accent1"/>
+          </a:effectRef>
+          <a:fontRef idx="minor">
+            <a:schemeClr val="tx1"/>
+          </a:fontRef>
+        </p:style>
+      </p:cxnSp>
+      <p:cxnSp>
+        <p:nvCxnSpPr>
+          <p:cNvPr id="78" name="Conector recto 77"/>
+          <p:cNvCxnSpPr>
+            <a:stCxn id="44" idx="0"/>
+            <a:endCxn id="36" idx="4"/>
+          </p:cNvCxnSpPr>
+          <p:nvPr/>
+        </p:nvCxnSpPr>
+        <p:spPr>
+          <a:xfrm flipH="1" flipV="1">
+            <a:off x="7061638" y="3625994"/>
+            <a:ext cx="422890" cy="993783"/>
+          </a:xfrm>
+          <a:prstGeom prst="line">
+            <a:avLst/>
+          </a:prstGeom>
+          <a:ln>
+            <a:solidFill>
+              <a:schemeClr val="tx1"/>
+            </a:solidFill>
+          </a:ln>
+        </p:spPr>
+        <p:style>
+          <a:lnRef idx="1">
+            <a:schemeClr val="accent1"/>
+          </a:lnRef>
+          <a:fillRef idx="0">
+            <a:schemeClr val="accent1"/>
+          </a:fillRef>
+          <a:effectRef idx="0">
+            <a:schemeClr val="accent1"/>
+          </a:effectRef>
+          <a:fontRef idx="minor">
+            <a:schemeClr val="tx1"/>
+          </a:fontRef>
+        </p:style>
+      </p:cxnSp>
+      <p:cxnSp>
+        <p:nvCxnSpPr>
+          <p:cNvPr id="79" name="Conector recto 78"/>
+          <p:cNvCxnSpPr>
+            <a:stCxn id="40" idx="0"/>
+            <a:endCxn id="39" idx="4"/>
+          </p:cNvCxnSpPr>
+          <p:nvPr/>
+        </p:nvCxnSpPr>
+        <p:spPr>
+          <a:xfrm flipV="1">
+            <a:off x="8622530" y="3621311"/>
+            <a:ext cx="258432" cy="975246"/>
+          </a:xfrm>
+          <a:prstGeom prst="line">
+            <a:avLst/>
+          </a:prstGeom>
+          <a:ln>
+            <a:solidFill>
+              <a:schemeClr val="tx1"/>
+            </a:solidFill>
+          </a:ln>
+        </p:spPr>
+        <p:style>
+          <a:lnRef idx="1">
+            <a:schemeClr val="accent1"/>
+          </a:lnRef>
+          <a:fillRef idx="0">
+            <a:schemeClr val="accent1"/>
+          </a:fillRef>
+          <a:effectRef idx="0">
+            <a:schemeClr val="accent1"/>
+          </a:effectRef>
+          <a:fontRef idx="minor">
+            <a:schemeClr val="tx1"/>
+          </a:fontRef>
+        </p:style>
+      </p:cxnSp>
+      <p:cxnSp>
+        <p:nvCxnSpPr>
+          <p:cNvPr id="82" name="Conector recto 81"/>
+          <p:cNvCxnSpPr>
+            <a:stCxn id="41" idx="0"/>
+            <a:endCxn id="39" idx="4"/>
+          </p:cNvCxnSpPr>
+          <p:nvPr/>
+        </p:nvCxnSpPr>
+        <p:spPr>
+          <a:xfrm flipH="1" flipV="1">
+            <a:off x="8880962" y="3621311"/>
+            <a:ext cx="590564" cy="959906"/>
+          </a:xfrm>
+          <a:prstGeom prst="line">
+            <a:avLst/>
+          </a:prstGeom>
+          <a:ln>
+            <a:solidFill>
+              <a:schemeClr val="tx1"/>
+            </a:solidFill>
+          </a:ln>
+        </p:spPr>
+        <p:style>
+          <a:lnRef idx="1">
+            <a:schemeClr val="accent1"/>
+          </a:lnRef>
+          <a:fillRef idx="0">
+            <a:schemeClr val="accent1"/>
+          </a:fillRef>
+          <a:effectRef idx="0">
+            <a:schemeClr val="accent1"/>
+          </a:effectRef>
+          <a:fontRef idx="minor">
+            <a:schemeClr val="tx1"/>
+          </a:fontRef>
+        </p:style>
+      </p:cxnSp>
+      <p:cxnSp>
+        <p:nvCxnSpPr>
+          <p:cNvPr id="85" name="Conector recto 84"/>
+          <p:cNvCxnSpPr>
+            <a:stCxn id="62" idx="0"/>
+            <a:endCxn id="41" idx="4"/>
+          </p:cNvCxnSpPr>
+          <p:nvPr/>
+        </p:nvCxnSpPr>
+        <p:spPr>
+          <a:xfrm flipV="1">
+            <a:off x="9001864" y="5081623"/>
+            <a:ext cx="469662" cy="634875"/>
+          </a:xfrm>
+          <a:prstGeom prst="line">
+            <a:avLst/>
+          </a:prstGeom>
+          <a:ln>
+            <a:solidFill>
+              <a:schemeClr val="tx1"/>
+            </a:solidFill>
+          </a:ln>
+        </p:spPr>
+        <p:style>
+          <a:lnRef idx="1">
+            <a:schemeClr val="accent1"/>
+          </a:lnRef>
+          <a:fillRef idx="0">
+            <a:schemeClr val="accent1"/>
+          </a:fillRef>
+          <a:effectRef idx="0">
+            <a:schemeClr val="accent1"/>
+          </a:effectRef>
+          <a:fontRef idx="minor">
+            <a:schemeClr val="tx1"/>
+          </a:fontRef>
+        </p:style>
+      </p:cxnSp>
+      <p:cxnSp>
+        <p:nvCxnSpPr>
+          <p:cNvPr id="90" name="Conector recto 89"/>
+          <p:cNvCxnSpPr>
+            <a:stCxn id="63" idx="0"/>
+            <a:endCxn id="41" idx="4"/>
+          </p:cNvCxnSpPr>
+          <p:nvPr/>
+        </p:nvCxnSpPr>
+        <p:spPr>
+          <a:xfrm flipH="1" flipV="1">
+            <a:off x="9471526" y="5081623"/>
+            <a:ext cx="527829" cy="634874"/>
+          </a:xfrm>
+          <a:prstGeom prst="line">
+            <a:avLst/>
+          </a:prstGeom>
+          <a:ln>
+            <a:solidFill>
+              <a:schemeClr val="tx1"/>
+            </a:solidFill>
+          </a:ln>
+        </p:spPr>
+        <p:style>
+          <a:lnRef idx="1">
+            <a:schemeClr val="accent1"/>
+          </a:lnRef>
+          <a:fillRef idx="0">
+            <a:schemeClr val="accent1"/>
+          </a:fillRef>
+          <a:effectRef idx="0">
+            <a:schemeClr val="accent1"/>
+          </a:effectRef>
+          <a:fontRef idx="minor">
+            <a:schemeClr val="tx1"/>
+          </a:fontRef>
+        </p:style>
+      </p:cxnSp>
+      <p:sp>
+        <p:nvSpPr>
+          <p:cNvPr id="149" name="CuadroTexto 148"/>
+          <p:cNvSpPr txBox="1"/>
+          <p:nvPr/>
+        </p:nvSpPr>
+        <p:spPr>
+          <a:xfrm>
+            <a:off x="4610679" y="3877687"/>
+            <a:ext cx="454631" cy="369332"/>
+          </a:xfrm>
+          <a:prstGeom prst="rect">
+            <a:avLst/>
+          </a:prstGeom>
+          <a:noFill/>
+        </p:spPr>
+        <p:txBody>
+          <a:bodyPr wrap="square" rtlCol="0">
+            <a:spAutoFit/>
+          </a:bodyPr>
+          <a:lstStyle/>
+          <a:p>
+            <a:r>
+              <a:rPr lang="es-ES" dirty="0">
+                <a:latin typeface="Arial" panose="020B0604020202020204" pitchFamily="34" charset="0"/>
+                <a:cs typeface="Arial" panose="020B0604020202020204" pitchFamily="34" charset="0"/>
+              </a:rPr>
+              <a:t>0</a:t>
+            </a:r>
+            <a:endParaRPr lang="en-US" dirty="0">
+              <a:latin typeface="Arial" panose="020B0604020202020204" pitchFamily="34" charset="0"/>
+              <a:cs typeface="Arial" panose="020B0604020202020204" pitchFamily="34" charset="0"/>
+            </a:endParaRPr>
+          </a:p>
+        </p:txBody>
+      </p:sp>
+      <p:sp>
+        <p:nvSpPr>
+          <p:cNvPr id="150" name="CuadroTexto 149"/>
+          <p:cNvSpPr txBox="1"/>
+          <p:nvPr/>
+        </p:nvSpPr>
+        <p:spPr>
+          <a:xfrm>
+            <a:off x="2701307" y="3833006"/>
+            <a:ext cx="454631" cy="369332"/>
+          </a:xfrm>
+          <a:prstGeom prst="rect">
+            <a:avLst/>
+          </a:prstGeom>
+          <a:noFill/>
+        </p:spPr>
+        <p:txBody>
+          <a:bodyPr wrap="square" rtlCol="0">
+            <a:spAutoFit/>
+          </a:bodyPr>
+          <a:lstStyle/>
+          <a:p>
+            <a:r>
+              <a:rPr lang="es-ES" dirty="0">
+                <a:latin typeface="Arial" panose="020B0604020202020204" pitchFamily="34" charset="0"/>
+                <a:cs typeface="Arial" panose="020B0604020202020204" pitchFamily="34" charset="0"/>
+              </a:rPr>
+              <a:t>0</a:t>
+            </a:r>
+            <a:endParaRPr lang="en-US" dirty="0">
+              <a:latin typeface="Arial" panose="020B0604020202020204" pitchFamily="34" charset="0"/>
+              <a:cs typeface="Arial" panose="020B0604020202020204" pitchFamily="34" charset="0"/>
+            </a:endParaRPr>
+          </a:p>
+        </p:txBody>
+      </p:sp>
+      <p:sp>
+        <p:nvSpPr>
+          <p:cNvPr id="151" name="CuadroTexto 150"/>
+          <p:cNvSpPr txBox="1"/>
+          <p:nvPr/>
+        </p:nvSpPr>
+        <p:spPr>
+          <a:xfrm>
+            <a:off x="8501628" y="3916598"/>
+            <a:ext cx="454631" cy="369332"/>
+          </a:xfrm>
+          <a:prstGeom prst="rect">
+            <a:avLst/>
+          </a:prstGeom>
+          <a:noFill/>
+        </p:spPr>
+        <p:txBody>
+          <a:bodyPr wrap="square" rtlCol="0">
+            <a:spAutoFit/>
+          </a:bodyPr>
+          <a:lstStyle/>
+          <a:p>
+            <a:r>
+              <a:rPr lang="es-ES" dirty="0">
+                <a:latin typeface="Arial" panose="020B0604020202020204" pitchFamily="34" charset="0"/>
+                <a:cs typeface="Arial" panose="020B0604020202020204" pitchFamily="34" charset="0"/>
+              </a:rPr>
+              <a:t>0</a:t>
+            </a:r>
+            <a:endParaRPr lang="en-US" dirty="0">
+              <a:latin typeface="Arial" panose="020B0604020202020204" pitchFamily="34" charset="0"/>
+              <a:cs typeface="Arial" panose="020B0604020202020204" pitchFamily="34" charset="0"/>
+            </a:endParaRPr>
+          </a:p>
+        </p:txBody>
+      </p:sp>
+      <p:sp>
+        <p:nvSpPr>
+          <p:cNvPr id="152" name="CuadroTexto 151"/>
+          <p:cNvSpPr txBox="1"/>
+          <p:nvPr/>
+        </p:nvSpPr>
+        <p:spPr>
+          <a:xfrm>
+            <a:off x="6622003" y="3888507"/>
+            <a:ext cx="454631" cy="369332"/>
+          </a:xfrm>
+          <a:prstGeom prst="rect">
+            <a:avLst/>
+          </a:prstGeom>
+          <a:noFill/>
+        </p:spPr>
+        <p:txBody>
+          <a:bodyPr wrap="square" rtlCol="0">
+            <a:spAutoFit/>
+          </a:bodyPr>
+          <a:lstStyle/>
+          <a:p>
+            <a:r>
+              <a:rPr lang="es-ES" dirty="0">
+                <a:latin typeface="Arial" panose="020B0604020202020204" pitchFamily="34" charset="0"/>
+                <a:cs typeface="Arial" panose="020B0604020202020204" pitchFamily="34" charset="0"/>
+              </a:rPr>
+              <a:t>0</a:t>
+            </a:r>
+            <a:endParaRPr lang="en-US" dirty="0">
+              <a:latin typeface="Arial" panose="020B0604020202020204" pitchFamily="34" charset="0"/>
+              <a:cs typeface="Arial" panose="020B0604020202020204" pitchFamily="34" charset="0"/>
+            </a:endParaRPr>
+          </a:p>
+        </p:txBody>
+      </p:sp>
+      <p:sp>
+        <p:nvSpPr>
+          <p:cNvPr id="153" name="CuadroTexto 152"/>
+          <p:cNvSpPr txBox="1"/>
+          <p:nvPr/>
+        </p:nvSpPr>
+        <p:spPr>
+          <a:xfrm>
+            <a:off x="7323562" y="2392662"/>
+            <a:ext cx="454631" cy="369332"/>
+          </a:xfrm>
+          <a:prstGeom prst="rect">
+            <a:avLst/>
+          </a:prstGeom>
+          <a:noFill/>
+        </p:spPr>
+        <p:txBody>
+          <a:bodyPr wrap="square" rtlCol="0">
+            <a:spAutoFit/>
+          </a:bodyPr>
+          <a:lstStyle/>
+          <a:p>
+            <a:r>
+              <a:rPr lang="es-ES" dirty="0">
+                <a:latin typeface="Arial" panose="020B0604020202020204" pitchFamily="34" charset="0"/>
+                <a:cs typeface="Arial" panose="020B0604020202020204" pitchFamily="34" charset="0"/>
+              </a:rPr>
+              <a:t>0</a:t>
+            </a:r>
+            <a:endParaRPr lang="en-US" dirty="0">
+              <a:latin typeface="Arial" panose="020B0604020202020204" pitchFamily="34" charset="0"/>
+              <a:cs typeface="Arial" panose="020B0604020202020204" pitchFamily="34" charset="0"/>
+            </a:endParaRPr>
+          </a:p>
+        </p:txBody>
+      </p:sp>
+      <p:sp>
+        <p:nvSpPr>
+          <p:cNvPr id="154" name="CuadroTexto 153"/>
+          <p:cNvSpPr txBox="1"/>
+          <p:nvPr/>
+        </p:nvSpPr>
+        <p:spPr>
+          <a:xfrm>
+            <a:off x="8941045" y="5187131"/>
+            <a:ext cx="454631" cy="369332"/>
+          </a:xfrm>
+          <a:prstGeom prst="rect">
+            <a:avLst/>
+          </a:prstGeom>
+          <a:noFill/>
+        </p:spPr>
+        <p:txBody>
+          <a:bodyPr wrap="square" rtlCol="0">
+            <a:spAutoFit/>
+          </a:bodyPr>
+          <a:lstStyle/>
+          <a:p>
+            <a:r>
+              <a:rPr lang="es-ES" dirty="0">
+                <a:latin typeface="Arial" panose="020B0604020202020204" pitchFamily="34" charset="0"/>
+                <a:cs typeface="Arial" panose="020B0604020202020204" pitchFamily="34" charset="0"/>
+              </a:rPr>
+              <a:t>0</a:t>
+            </a:r>
+            <a:endParaRPr lang="en-US" dirty="0">
+              <a:latin typeface="Arial" panose="020B0604020202020204" pitchFamily="34" charset="0"/>
+              <a:cs typeface="Arial" panose="020B0604020202020204" pitchFamily="34" charset="0"/>
+            </a:endParaRPr>
+          </a:p>
+        </p:txBody>
+      </p:sp>
+      <p:sp>
+        <p:nvSpPr>
+          <p:cNvPr id="155" name="CuadroTexto 154"/>
+          <p:cNvSpPr txBox="1"/>
+          <p:nvPr/>
+        </p:nvSpPr>
+        <p:spPr>
+          <a:xfrm>
+            <a:off x="3324748" y="2538742"/>
+            <a:ext cx="454631" cy="369332"/>
+          </a:xfrm>
+          <a:prstGeom prst="rect">
+            <a:avLst/>
+          </a:prstGeom>
+          <a:noFill/>
+        </p:spPr>
+        <p:txBody>
+          <a:bodyPr wrap="square" rtlCol="0">
+            <a:spAutoFit/>
+          </a:bodyPr>
+          <a:lstStyle/>
+          <a:p>
+            <a:r>
+              <a:rPr lang="es-ES" dirty="0">
+                <a:latin typeface="Arial" panose="020B0604020202020204" pitchFamily="34" charset="0"/>
+                <a:cs typeface="Arial" panose="020B0604020202020204" pitchFamily="34" charset="0"/>
+              </a:rPr>
+              <a:t>0</a:t>
+            </a:r>
+            <a:endParaRPr lang="en-US" dirty="0">
+              <a:latin typeface="Arial" panose="020B0604020202020204" pitchFamily="34" charset="0"/>
+              <a:cs typeface="Arial" panose="020B0604020202020204" pitchFamily="34" charset="0"/>
+            </a:endParaRPr>
+          </a:p>
+        </p:txBody>
+      </p:sp>
+      <p:sp>
+        <p:nvSpPr>
+          <p:cNvPr id="156" name="CuadroTexto 155"/>
+          <p:cNvSpPr txBox="1"/>
+          <p:nvPr/>
+        </p:nvSpPr>
+        <p:spPr>
+          <a:xfrm>
+            <a:off x="7177814" y="3862630"/>
+            <a:ext cx="312906" cy="369332"/>
+          </a:xfrm>
+          <a:prstGeom prst="rect">
+            <a:avLst/>
+          </a:prstGeom>
+          <a:noFill/>
+        </p:spPr>
+        <p:txBody>
+          <a:bodyPr wrap="none" rtlCol="0">
+            <a:spAutoFit/>
+          </a:bodyPr>
+          <a:lstStyle/>
+          <a:p>
+            <a:r>
+              <a:rPr lang="es-ES" dirty="0" smtClean="0">
+                <a:latin typeface="Arial" panose="020B0604020202020204" pitchFamily="34" charset="0"/>
+                <a:cs typeface="Arial" panose="020B0604020202020204" pitchFamily="34" charset="0"/>
+              </a:rPr>
+              <a:t>1</a:t>
+            </a:r>
+            <a:endParaRPr lang="en-US" dirty="0">
+              <a:latin typeface="Arial" panose="020B0604020202020204" pitchFamily="34" charset="0"/>
+              <a:cs typeface="Arial" panose="020B0604020202020204" pitchFamily="34" charset="0"/>
+            </a:endParaRPr>
+          </a:p>
+        </p:txBody>
+      </p:sp>
+      <p:sp>
+        <p:nvSpPr>
+          <p:cNvPr id="157" name="CuadroTexto 156"/>
+          <p:cNvSpPr txBox="1"/>
+          <p:nvPr/>
+        </p:nvSpPr>
+        <p:spPr>
+          <a:xfrm>
+            <a:off x="4595433" y="2466527"/>
+            <a:ext cx="312906" cy="369332"/>
+          </a:xfrm>
+          <a:prstGeom prst="rect">
+            <a:avLst/>
+          </a:prstGeom>
+          <a:noFill/>
+        </p:spPr>
+        <p:txBody>
+          <a:bodyPr wrap="none" rtlCol="0">
+            <a:spAutoFit/>
+          </a:bodyPr>
+          <a:lstStyle/>
+          <a:p>
+            <a:r>
+              <a:rPr lang="es-ES" dirty="0" smtClean="0">
+                <a:latin typeface="Arial" panose="020B0604020202020204" pitchFamily="34" charset="0"/>
+                <a:cs typeface="Arial" panose="020B0604020202020204" pitchFamily="34" charset="0"/>
+              </a:rPr>
+              <a:t>1</a:t>
+            </a:r>
+            <a:endParaRPr lang="en-US" dirty="0">
+              <a:latin typeface="Arial" panose="020B0604020202020204" pitchFamily="34" charset="0"/>
+              <a:cs typeface="Arial" panose="020B0604020202020204" pitchFamily="34" charset="0"/>
+            </a:endParaRPr>
+          </a:p>
+        </p:txBody>
+      </p:sp>
+      <p:sp>
+        <p:nvSpPr>
+          <p:cNvPr id="158" name="CuadroTexto 157"/>
+          <p:cNvSpPr txBox="1"/>
+          <p:nvPr/>
+        </p:nvSpPr>
+        <p:spPr>
+          <a:xfrm>
+            <a:off x="5253818" y="3914172"/>
+            <a:ext cx="312906" cy="369332"/>
+          </a:xfrm>
+          <a:prstGeom prst="rect">
+            <a:avLst/>
+          </a:prstGeom>
+          <a:noFill/>
+        </p:spPr>
+        <p:txBody>
+          <a:bodyPr wrap="none" rtlCol="0">
+            <a:spAutoFit/>
+          </a:bodyPr>
+          <a:lstStyle/>
+          <a:p>
+            <a:r>
+              <a:rPr lang="es-ES" dirty="0" smtClean="0">
+                <a:latin typeface="Arial" panose="020B0604020202020204" pitchFamily="34" charset="0"/>
+                <a:cs typeface="Arial" panose="020B0604020202020204" pitchFamily="34" charset="0"/>
+              </a:rPr>
+              <a:t>1</a:t>
+            </a:r>
+            <a:endParaRPr lang="en-US" dirty="0">
+              <a:latin typeface="Arial" panose="020B0604020202020204" pitchFamily="34" charset="0"/>
+              <a:cs typeface="Arial" panose="020B0604020202020204" pitchFamily="34" charset="0"/>
+            </a:endParaRPr>
+          </a:p>
+        </p:txBody>
+      </p:sp>
+      <p:sp>
+        <p:nvSpPr>
+          <p:cNvPr id="159" name="CuadroTexto 158"/>
+          <p:cNvSpPr txBox="1"/>
+          <p:nvPr/>
+        </p:nvSpPr>
+        <p:spPr>
+          <a:xfrm>
+            <a:off x="9681125" y="5162500"/>
+            <a:ext cx="312906" cy="369332"/>
+          </a:xfrm>
+          <a:prstGeom prst="rect">
+            <a:avLst/>
+          </a:prstGeom>
+          <a:noFill/>
+        </p:spPr>
+        <p:txBody>
+          <a:bodyPr wrap="none" rtlCol="0">
+            <a:spAutoFit/>
+          </a:bodyPr>
+          <a:lstStyle/>
+          <a:p>
+            <a:r>
+              <a:rPr lang="es-ES" dirty="0" smtClean="0">
+                <a:latin typeface="Arial" panose="020B0604020202020204" pitchFamily="34" charset="0"/>
+                <a:cs typeface="Arial" panose="020B0604020202020204" pitchFamily="34" charset="0"/>
+              </a:rPr>
+              <a:t>1</a:t>
+            </a:r>
+            <a:endParaRPr lang="en-US" dirty="0">
+              <a:latin typeface="Arial" panose="020B0604020202020204" pitchFamily="34" charset="0"/>
+              <a:cs typeface="Arial" panose="020B0604020202020204" pitchFamily="34" charset="0"/>
+            </a:endParaRPr>
+          </a:p>
+        </p:txBody>
+      </p:sp>
+      <p:sp>
+        <p:nvSpPr>
+          <p:cNvPr id="160" name="CuadroTexto 159"/>
+          <p:cNvSpPr txBox="1"/>
+          <p:nvPr/>
+        </p:nvSpPr>
+        <p:spPr>
+          <a:xfrm>
+            <a:off x="9138265" y="3947202"/>
+            <a:ext cx="312906" cy="369332"/>
+          </a:xfrm>
+          <a:prstGeom prst="rect">
+            <a:avLst/>
+          </a:prstGeom>
+          <a:noFill/>
+        </p:spPr>
+        <p:txBody>
+          <a:bodyPr wrap="none" rtlCol="0">
+            <a:spAutoFit/>
+          </a:bodyPr>
+          <a:lstStyle/>
+          <a:p>
+            <a:r>
+              <a:rPr lang="es-ES" dirty="0" smtClean="0">
+                <a:latin typeface="Arial" panose="020B0604020202020204" pitchFamily="34" charset="0"/>
+                <a:cs typeface="Arial" panose="020B0604020202020204" pitchFamily="34" charset="0"/>
+              </a:rPr>
+              <a:t>1</a:t>
+            </a:r>
+            <a:endParaRPr lang="en-US" dirty="0">
+              <a:latin typeface="Arial" panose="020B0604020202020204" pitchFamily="34" charset="0"/>
+              <a:cs typeface="Arial" panose="020B0604020202020204" pitchFamily="34" charset="0"/>
+            </a:endParaRPr>
+          </a:p>
+        </p:txBody>
+      </p:sp>
+      <p:sp>
+        <p:nvSpPr>
+          <p:cNvPr id="161" name="CuadroTexto 160"/>
+          <p:cNvSpPr txBox="1"/>
+          <p:nvPr/>
+        </p:nvSpPr>
+        <p:spPr>
+          <a:xfrm>
+            <a:off x="8405011" y="2456286"/>
+            <a:ext cx="312906" cy="369332"/>
+          </a:xfrm>
+          <a:prstGeom prst="rect">
+            <a:avLst/>
+          </a:prstGeom>
+          <a:noFill/>
+        </p:spPr>
+        <p:txBody>
+          <a:bodyPr wrap="none" rtlCol="0">
+            <a:spAutoFit/>
+          </a:bodyPr>
+          <a:lstStyle/>
+          <a:p>
+            <a:r>
+              <a:rPr lang="es-ES" dirty="0" smtClean="0">
+                <a:latin typeface="Arial" panose="020B0604020202020204" pitchFamily="34" charset="0"/>
+                <a:cs typeface="Arial" panose="020B0604020202020204" pitchFamily="34" charset="0"/>
+              </a:rPr>
+              <a:t>1</a:t>
+            </a:r>
+            <a:endParaRPr lang="en-US" dirty="0">
+              <a:latin typeface="Arial" panose="020B0604020202020204" pitchFamily="34" charset="0"/>
+              <a:cs typeface="Arial" panose="020B0604020202020204" pitchFamily="34" charset="0"/>
+            </a:endParaRPr>
+          </a:p>
+        </p:txBody>
+      </p:sp>
+      <p:sp>
+        <p:nvSpPr>
+          <p:cNvPr id="162" name="CuadroTexto 161"/>
+          <p:cNvSpPr txBox="1"/>
+          <p:nvPr/>
+        </p:nvSpPr>
+        <p:spPr>
+          <a:xfrm>
+            <a:off x="3329896" y="3915362"/>
+            <a:ext cx="312906" cy="369332"/>
+          </a:xfrm>
+          <a:prstGeom prst="rect">
+            <a:avLst/>
+          </a:prstGeom>
+          <a:noFill/>
+        </p:spPr>
+        <p:txBody>
+          <a:bodyPr wrap="none" rtlCol="0">
+            <a:spAutoFit/>
+          </a:bodyPr>
+          <a:lstStyle/>
+          <a:p>
+            <a:r>
+              <a:rPr lang="es-ES" dirty="0" smtClean="0">
+                <a:latin typeface="Arial" panose="020B0604020202020204" pitchFamily="34" charset="0"/>
+                <a:cs typeface="Arial" panose="020B0604020202020204" pitchFamily="34" charset="0"/>
+              </a:rPr>
+              <a:t>1</a:t>
+            </a:r>
+            <a:endParaRPr lang="en-US" dirty="0">
+              <a:latin typeface="Arial" panose="020B0604020202020204" pitchFamily="34" charset="0"/>
+              <a:cs typeface="Arial" panose="020B0604020202020204" pitchFamily="34" charset="0"/>
+            </a:endParaRPr>
+          </a:p>
+        </p:txBody>
+      </p:sp>
+    </p:spTree>
+    <p:extLst>
+      <p:ext uri="{BB962C8B-B14F-4D97-AF65-F5344CB8AC3E}">
+        <p14:creationId xmlns:p14="http://schemas.microsoft.com/office/powerpoint/2010/main" val="246903304"/>
+      </p:ext>
+    </p:extLst>
+  </p:cSld>
+  <p:clrMapOvr>
+    <a:masterClrMapping/>
+  </p:clrMapOvr>
+</p:sld>
+</file>
+
 <file path=ppt/theme/theme1.xml><?xml version="1.0" encoding="utf-8"?>
 <a:theme xmlns:a="http://schemas.openxmlformats.org/drawingml/2006/main" name="Tema de Office">
   <a:themeElements>

</xml_diff>